<commit_message>
Update Firebase DB 구성 20210810.pptx
</commit_message>
<xml_diff>
--- a/개발현황/Firebase DB 구성 20210810.pptx
+++ b/개발현황/Firebase DB 구성 20210810.pptx
@@ -8,12 +8,11 @@
     <p:sldId id="271" r:id="rId2"/>
     <p:sldId id="272" r:id="rId3"/>
     <p:sldId id="274" r:id="rId4"/>
-    <p:sldId id="273" r:id="rId5"/>
-    <p:sldId id="259" r:id="rId6"/>
-    <p:sldId id="265" r:id="rId7"/>
-    <p:sldId id="266" r:id="rId8"/>
-    <p:sldId id="267" r:id="rId9"/>
-    <p:sldId id="268" r:id="rId10"/>
+    <p:sldId id="259" r:id="rId5"/>
+    <p:sldId id="265" r:id="rId6"/>
+    <p:sldId id="266" r:id="rId7"/>
+    <p:sldId id="267" r:id="rId8"/>
+    <p:sldId id="268" r:id="rId9"/>
   </p:sldIdLst>
   <p:sldSz cx="12192000" cy="6858000"/>
   <p:notesSz cx="6858000" cy="9144000"/>
@@ -120,7 +119,6 @@
             <p14:sldId id="271"/>
             <p14:sldId id="272"/>
             <p14:sldId id="274"/>
-            <p14:sldId id="273"/>
           </p14:sldIdLst>
         </p14:section>
         <p14:section name="파이어베이스 구축" id="{616D0668-0961-4567-AAE5-315EEFD7FC60}">
@@ -272,7 +270,7 @@
           <a:p>
             <a:fld id="{DDEC9453-0358-4B2E-A5E7-7F5A98A5D4D3}" type="datetimeFigureOut">
               <a:rPr lang="ko-KR" altLang="en-US" smtClean="0"/>
-              <a:t>2021-08-10</a:t>
+              <a:t>2021-08-12</a:t>
             </a:fld>
             <a:endParaRPr lang="ko-KR" altLang="en-US"/>
           </a:p>
@@ -442,7 +440,7 @@
           <a:p>
             <a:fld id="{DDEC9453-0358-4B2E-A5E7-7F5A98A5D4D3}" type="datetimeFigureOut">
               <a:rPr lang="ko-KR" altLang="en-US" smtClean="0"/>
-              <a:t>2021-08-10</a:t>
+              <a:t>2021-08-12</a:t>
             </a:fld>
             <a:endParaRPr lang="ko-KR" altLang="en-US"/>
           </a:p>
@@ -622,7 +620,7 @@
           <a:p>
             <a:fld id="{DDEC9453-0358-4B2E-A5E7-7F5A98A5D4D3}" type="datetimeFigureOut">
               <a:rPr lang="ko-KR" altLang="en-US" smtClean="0"/>
-              <a:t>2021-08-10</a:t>
+              <a:t>2021-08-12</a:t>
             </a:fld>
             <a:endParaRPr lang="ko-KR" altLang="en-US"/>
           </a:p>
@@ -792,7 +790,7 @@
           <a:p>
             <a:fld id="{DDEC9453-0358-4B2E-A5E7-7F5A98A5D4D3}" type="datetimeFigureOut">
               <a:rPr lang="ko-KR" altLang="en-US" smtClean="0"/>
-              <a:t>2021-08-10</a:t>
+              <a:t>2021-08-12</a:t>
             </a:fld>
             <a:endParaRPr lang="ko-KR" altLang="en-US"/>
           </a:p>
@@ -1038,7 +1036,7 @@
           <a:p>
             <a:fld id="{DDEC9453-0358-4B2E-A5E7-7F5A98A5D4D3}" type="datetimeFigureOut">
               <a:rPr lang="ko-KR" altLang="en-US" smtClean="0"/>
-              <a:t>2021-08-10</a:t>
+              <a:t>2021-08-12</a:t>
             </a:fld>
             <a:endParaRPr lang="ko-KR" altLang="en-US"/>
           </a:p>
@@ -1270,7 +1268,7 @@
           <a:p>
             <a:fld id="{DDEC9453-0358-4B2E-A5E7-7F5A98A5D4D3}" type="datetimeFigureOut">
               <a:rPr lang="ko-KR" altLang="en-US" smtClean="0"/>
-              <a:t>2021-08-10</a:t>
+              <a:t>2021-08-12</a:t>
             </a:fld>
             <a:endParaRPr lang="ko-KR" altLang="en-US"/>
           </a:p>
@@ -1637,7 +1635,7 @@
           <a:p>
             <a:fld id="{DDEC9453-0358-4B2E-A5E7-7F5A98A5D4D3}" type="datetimeFigureOut">
               <a:rPr lang="ko-KR" altLang="en-US" smtClean="0"/>
-              <a:t>2021-08-10</a:t>
+              <a:t>2021-08-12</a:t>
             </a:fld>
             <a:endParaRPr lang="ko-KR" altLang="en-US"/>
           </a:p>
@@ -1755,7 +1753,7 @@
           <a:p>
             <a:fld id="{DDEC9453-0358-4B2E-A5E7-7F5A98A5D4D3}" type="datetimeFigureOut">
               <a:rPr lang="ko-KR" altLang="en-US" smtClean="0"/>
-              <a:t>2021-08-10</a:t>
+              <a:t>2021-08-12</a:t>
             </a:fld>
             <a:endParaRPr lang="ko-KR" altLang="en-US"/>
           </a:p>
@@ -1850,7 +1848,7 @@
           <a:p>
             <a:fld id="{DDEC9453-0358-4B2E-A5E7-7F5A98A5D4D3}" type="datetimeFigureOut">
               <a:rPr lang="ko-KR" altLang="en-US" smtClean="0"/>
-              <a:t>2021-08-10</a:t>
+              <a:t>2021-08-12</a:t>
             </a:fld>
             <a:endParaRPr lang="ko-KR" altLang="en-US"/>
           </a:p>
@@ -2127,7 +2125,7 @@
           <a:p>
             <a:fld id="{DDEC9453-0358-4B2E-A5E7-7F5A98A5D4D3}" type="datetimeFigureOut">
               <a:rPr lang="ko-KR" altLang="en-US" smtClean="0"/>
-              <a:t>2021-08-10</a:t>
+              <a:t>2021-08-12</a:t>
             </a:fld>
             <a:endParaRPr lang="ko-KR" altLang="en-US"/>
           </a:p>
@@ -2380,7 +2378,7 @@
           <a:p>
             <a:fld id="{DDEC9453-0358-4B2E-A5E7-7F5A98A5D4D3}" type="datetimeFigureOut">
               <a:rPr lang="ko-KR" altLang="en-US" smtClean="0"/>
-              <a:t>2021-08-10</a:t>
+              <a:t>2021-08-12</a:t>
             </a:fld>
             <a:endParaRPr lang="ko-KR" altLang="en-US"/>
           </a:p>
@@ -2593,7 +2591,7 @@
           <a:p>
             <a:fld id="{DDEC9453-0358-4B2E-A5E7-7F5A98A5D4D3}" type="datetimeFigureOut">
               <a:rPr lang="ko-KR" altLang="en-US" smtClean="0"/>
-              <a:t>2021-08-10</a:t>
+              <a:t>2021-08-12</a:t>
             </a:fld>
             <a:endParaRPr lang="ko-KR" altLang="en-US"/>
           </a:p>
@@ -4962,43 +4960,6 @@
           <a:chExt cx="0" cy="0"/>
         </a:xfrm>
       </p:grpSpPr>
-    </p:spTree>
-    <p:extLst>
-      <p:ext uri="{BB962C8B-B14F-4D97-AF65-F5344CB8AC3E}">
-        <p14:creationId xmlns:p14="http://schemas.microsoft.com/office/powerpoint/2010/main" val="4164367839"/>
-      </p:ext>
-    </p:extLst>
-  </p:cSld>
-  <p:clrMapOvr>
-    <a:masterClrMapping/>
-  </p:clrMapOvr>
-  <p:timing>
-    <p:tnLst>
-      <p:par>
-        <p:cTn id="1" dur="indefinite" restart="never" nodeType="tmRoot"/>
-      </p:par>
-    </p:tnLst>
-  </p:timing>
-</p:sld>
-</file>
-
-<file path=ppt/slides/slide5.xml><?xml version="1.0" encoding="utf-8"?>
-<p:sld xmlns:a="http://schemas.openxmlformats.org/drawingml/2006/main" xmlns:r="http://schemas.openxmlformats.org/officeDocument/2006/relationships" xmlns:p="http://schemas.openxmlformats.org/presentationml/2006/main">
-  <p:cSld>
-    <p:spTree>
-      <p:nvGrpSpPr>
-        <p:cNvPr id="1" name=""/>
-        <p:cNvGrpSpPr/>
-        <p:nvPr/>
-      </p:nvGrpSpPr>
-      <p:grpSpPr>
-        <a:xfrm>
-          <a:off x="0" y="0"/>
-          <a:ext cx="0" cy="0"/>
-          <a:chOff x="0" y="0"/>
-          <a:chExt cx="0" cy="0"/>
-        </a:xfrm>
-      </p:grpSpPr>
       <p:sp>
         <p:nvSpPr>
           <p:cNvPr id="2" name="제목 1"/>
@@ -5015,24 +4976,20 @@
           <a:lstStyle/>
           <a:p>
             <a:r>
-              <a:rPr lang="ko-KR" altLang="en-US" dirty="0" err="1" smtClean="0"/>
-              <a:t>파이어베이스</a:t>
-            </a:r>
-            <a:r>
-              <a:rPr lang="ko-KR" altLang="en-US" dirty="0" smtClean="0"/>
-              <a:t> 구축 </a:t>
-            </a:r>
-            <a:r>
-              <a:rPr lang="en-US" altLang="ko-KR" dirty="0" smtClean="0"/>
-              <a:t>(</a:t>
-            </a:r>
-            <a:r>
               <a:rPr lang="en-US" altLang="ko-KR" dirty="0" err="1" smtClean="0"/>
               <a:t>FireStore</a:t>
             </a:r>
             <a:r>
+              <a:rPr lang="en-US" altLang="ko-KR" dirty="0"/>
+              <a:t> </a:t>
+            </a:r>
+            <a:r>
               <a:rPr lang="en-US" altLang="ko-KR" dirty="0" smtClean="0"/>
-              <a:t>)</a:t>
+              <a:t>- </a:t>
+            </a:r>
+            <a:r>
+              <a:rPr lang="en-US" altLang="ko-KR" dirty="0" err="1" smtClean="0"/>
+              <a:t>user_account</a:t>
             </a:r>
             <a:endParaRPr lang="ko-KR" altLang="en-US" dirty="0"/>
           </a:p>
@@ -5344,7 +5301,7 @@
         <p:spPr>
           <a:xfrm>
             <a:off x="944088" y="1442852"/>
-            <a:ext cx="3876382" cy="646331"/>
+            <a:ext cx="3876382" cy="369332"/>
           </a:xfrm>
           <a:prstGeom prst="rect">
             <a:avLst/>
@@ -5358,15 +5315,12 @@
           <a:lstStyle/>
           <a:p>
             <a:r>
-              <a:rPr lang="en-US" altLang="ko-KR" dirty="0" err="1" smtClean="0"/>
-              <a:t>user_account</a:t>
-            </a:r>
-            <a:endParaRPr lang="en-US" altLang="ko-KR" dirty="0" smtClean="0"/>
-          </a:p>
-          <a:p>
-            <a:r>
               <a:rPr lang="ko-KR" altLang="en-US" dirty="0" smtClean="0"/>
-              <a:t>각 운전자 정보를 계정 단위로 관리</a:t>
+              <a:t>각 </a:t>
+            </a:r>
+            <a:r>
+              <a:rPr lang="ko-KR" altLang="en-US" dirty="0" smtClean="0"/>
+              <a:t>운전자 정보를 계정 단위로 관리</a:t>
             </a:r>
             <a:r>
               <a:rPr lang="en-US" altLang="ko-KR" dirty="0" smtClean="0"/>
@@ -5559,7 +5513,7 @@
 </p:sld>
 </file>
 
-<file path=ppt/slides/slide6.xml><?xml version="1.0" encoding="utf-8"?>
+<file path=ppt/slides/slide5.xml><?xml version="1.0" encoding="utf-8"?>
 <p:sld xmlns:a="http://schemas.openxmlformats.org/drawingml/2006/main" xmlns:r="http://schemas.openxmlformats.org/officeDocument/2006/relationships" xmlns:p="http://schemas.openxmlformats.org/presentationml/2006/main">
   <p:cSld>
     <p:spTree>
@@ -5592,24 +5546,20 @@
           <a:lstStyle/>
           <a:p>
             <a:r>
-              <a:rPr lang="ko-KR" altLang="en-US" dirty="0" err="1" smtClean="0"/>
-              <a:t>파이어베이스</a:t>
-            </a:r>
-            <a:r>
-              <a:rPr lang="ko-KR" altLang="en-US" dirty="0" smtClean="0"/>
-              <a:t> 구축 </a:t>
-            </a:r>
-            <a:r>
-              <a:rPr lang="en-US" altLang="ko-KR" dirty="0" smtClean="0"/>
-              <a:t>(</a:t>
-            </a:r>
-            <a:r>
               <a:rPr lang="en-US" altLang="ko-KR" dirty="0" err="1" smtClean="0"/>
               <a:t>FireStore</a:t>
             </a:r>
             <a:r>
+              <a:rPr lang="en-US" altLang="ko-KR" dirty="0"/>
+              <a:t> </a:t>
+            </a:r>
+            <a:r>
               <a:rPr lang="en-US" altLang="ko-KR" dirty="0" smtClean="0"/>
-              <a:t>)</a:t>
+              <a:t>- </a:t>
+            </a:r>
+            <a:r>
+              <a:rPr lang="en-US" altLang="ko-KR" dirty="0" err="1" smtClean="0"/>
+              <a:t>uiux_preset</a:t>
             </a:r>
             <a:endParaRPr lang="ko-KR" altLang="en-US" dirty="0"/>
           </a:p>
@@ -5937,7 +5887,7 @@
         <p:spPr>
           <a:xfrm>
             <a:off x="944088" y="1442852"/>
-            <a:ext cx="4493538" cy="646331"/>
+            <a:ext cx="4493538" cy="369332"/>
           </a:xfrm>
           <a:prstGeom prst="rect">
             <a:avLst/>
@@ -5949,13 +5899,6 @@
             <a:spAutoFit/>
           </a:bodyPr>
           <a:lstStyle/>
-          <a:p>
-            <a:r>
-              <a:rPr lang="en-US" altLang="ko-KR" dirty="0" err="1" smtClean="0"/>
-              <a:t>uiux_preset</a:t>
-            </a:r>
-            <a:endParaRPr lang="en-US" altLang="ko-KR" dirty="0" smtClean="0"/>
-          </a:p>
           <a:p>
             <a:r>
               <a:rPr lang="ko-KR" altLang="en-US" dirty="0" smtClean="0"/>
@@ -6066,6 +6009,1290 @@
     <p:extLst>
       <p:ext uri="{BB962C8B-B14F-4D97-AF65-F5344CB8AC3E}">
         <p14:creationId xmlns:p14="http://schemas.microsoft.com/office/powerpoint/2010/main" val="3732792170"/>
+      </p:ext>
+    </p:extLst>
+  </p:cSld>
+  <p:clrMapOvr>
+    <a:masterClrMapping/>
+  </p:clrMapOvr>
+  <p:timing>
+    <p:tnLst>
+      <p:par>
+        <p:cTn id="1" dur="indefinite" restart="never" nodeType="tmRoot"/>
+      </p:par>
+    </p:tnLst>
+  </p:timing>
+</p:sld>
+</file>
+
+<file path=ppt/slides/slide6.xml><?xml version="1.0" encoding="utf-8"?>
+<p:sld xmlns:a="http://schemas.openxmlformats.org/drawingml/2006/main" xmlns:r="http://schemas.openxmlformats.org/officeDocument/2006/relationships" xmlns:p="http://schemas.openxmlformats.org/presentationml/2006/main">
+  <p:cSld>
+    <p:spTree>
+      <p:nvGrpSpPr>
+        <p:cNvPr id="1" name=""/>
+        <p:cNvGrpSpPr/>
+        <p:nvPr/>
+      </p:nvGrpSpPr>
+      <p:grpSpPr>
+        <a:xfrm>
+          <a:off x="0" y="0"/>
+          <a:ext cx="0" cy="0"/>
+          <a:chOff x="0" y="0"/>
+          <a:chExt cx="0" cy="0"/>
+        </a:xfrm>
+      </p:grpSpPr>
+      <p:sp>
+        <p:nvSpPr>
+          <p:cNvPr id="2" name="제목 1"/>
+          <p:cNvSpPr>
+            <a:spLocks noGrp="1"/>
+          </p:cNvSpPr>
+          <p:nvPr>
+            <p:ph type="title"/>
+          </p:nvPr>
+        </p:nvSpPr>
+        <p:spPr/>
+        <p:txBody>
+          <a:bodyPr/>
+          <a:lstStyle/>
+          <a:p>
+            <a:r>
+              <a:rPr lang="en-US" altLang="ko-KR" dirty="0" err="1" smtClean="0"/>
+              <a:t>FireStore</a:t>
+            </a:r>
+            <a:r>
+              <a:rPr lang="en-US" altLang="ko-KR" dirty="0"/>
+              <a:t> </a:t>
+            </a:r>
+            <a:r>
+              <a:rPr lang="en-US" altLang="ko-KR" dirty="0" smtClean="0"/>
+              <a:t>- </a:t>
+            </a:r>
+            <a:r>
+              <a:rPr lang="en-US" altLang="ko-KR" dirty="0" err="1" smtClean="0"/>
+              <a:t>schedule_mode</a:t>
+            </a:r>
+            <a:endParaRPr lang="ko-KR" altLang="en-US" dirty="0"/>
+          </a:p>
+        </p:txBody>
+      </p:sp>
+      <p:graphicFrame>
+        <p:nvGraphicFramePr>
+          <p:cNvPr id="3" name="표 2"/>
+          <p:cNvGraphicFramePr>
+            <a:graphicFrameLocks noGrp="1"/>
+          </p:cNvGraphicFramePr>
+          <p:nvPr>
+            <p:extLst>
+              <p:ext uri="{D42A27DB-BD31-4B8C-83A1-F6EECF244321}">
+                <p14:modId xmlns:p14="http://schemas.microsoft.com/office/powerpoint/2010/main" val="4009914472"/>
+              </p:ext>
+            </p:extLst>
+          </p:nvPr>
+        </p:nvGraphicFramePr>
+        <p:xfrm>
+          <a:off x="992908" y="1936749"/>
+          <a:ext cx="9908639" cy="4800601"/>
+        </p:xfrm>
+        <a:graphic>
+          <a:graphicData uri="http://schemas.openxmlformats.org/drawingml/2006/table">
+            <a:tbl>
+              <a:tblPr firstRow="1" bandRow="1">
+                <a:tableStyleId>{5940675A-B579-460E-94D1-54222C63F5DA}</a:tableStyleId>
+              </a:tblPr>
+              <a:tblGrid>
+                <a:gridCol w="1824176"/>
+                <a:gridCol w="2055989"/>
+                <a:gridCol w="6028474"/>
+              </a:tblGrid>
+              <a:tr h="342901">
+                <a:tc>
+                  <a:txBody>
+                    <a:bodyPr/>
+                    <a:lstStyle/>
+                    <a:p>
+                      <a:pPr algn="ctr" latinLnBrk="1"/>
+                      <a:r>
+                        <a:rPr lang="ko-KR" altLang="en-US" sz="1200" b="1" dirty="0" err="1" smtClean="0"/>
+                        <a:t>필드명</a:t>
+                      </a:r>
+                      <a:endParaRPr lang="ko-KR" altLang="en-US" sz="1200" b="1" dirty="0"/>
+                    </a:p>
+                  </a:txBody>
+                  <a:tcPr anchor="ctr">
+                    <a:solidFill>
+                      <a:schemeClr val="bg1">
+                        <a:lumMod val="85000"/>
+                      </a:schemeClr>
+                    </a:solidFill>
+                  </a:tcPr>
+                </a:tc>
+                <a:tc>
+                  <a:txBody>
+                    <a:bodyPr/>
+                    <a:lstStyle/>
+                    <a:p>
+                      <a:pPr algn="ctr" latinLnBrk="1"/>
+                      <a:r>
+                        <a:rPr lang="ko-KR" altLang="en-US" sz="1200" b="1" dirty="0" smtClean="0"/>
+                        <a:t>타입 </a:t>
+                      </a:r>
+                      <a:r>
+                        <a:rPr lang="en-US" altLang="ko-KR" sz="1200" b="1" dirty="0" smtClean="0"/>
+                        <a:t>(</a:t>
+                      </a:r>
+                      <a:r>
+                        <a:rPr lang="ko-KR" altLang="en-US" sz="1200" b="1" dirty="0" smtClean="0"/>
+                        <a:t>암시적</a:t>
+                      </a:r>
+                      <a:r>
+                        <a:rPr lang="en-US" altLang="ko-KR" sz="1200" b="1" dirty="0" smtClean="0"/>
+                        <a:t>)</a:t>
+                      </a:r>
+                      <a:endParaRPr lang="ko-KR" altLang="en-US" sz="1200" b="1" dirty="0"/>
+                    </a:p>
+                  </a:txBody>
+                  <a:tcPr anchor="ctr">
+                    <a:solidFill>
+                      <a:schemeClr val="bg1">
+                        <a:lumMod val="85000"/>
+                      </a:schemeClr>
+                    </a:solidFill>
+                  </a:tcPr>
+                </a:tc>
+                <a:tc>
+                  <a:txBody>
+                    <a:bodyPr/>
+                    <a:lstStyle/>
+                    <a:p>
+                      <a:pPr algn="ctr" latinLnBrk="1"/>
+                      <a:r>
+                        <a:rPr lang="ko-KR" altLang="en-US" sz="1200" b="1" dirty="0" smtClean="0"/>
+                        <a:t>설명</a:t>
+                      </a:r>
+                      <a:endParaRPr lang="ko-KR" altLang="en-US" sz="1200" b="1" dirty="0"/>
+                    </a:p>
+                  </a:txBody>
+                  <a:tcPr anchor="ctr">
+                    <a:solidFill>
+                      <a:schemeClr val="bg1">
+                        <a:lumMod val="85000"/>
+                      </a:schemeClr>
+                    </a:solidFill>
+                  </a:tcPr>
+                </a:tc>
+              </a:tr>
+              <a:tr h="332901">
+                <a:tc>
+                  <a:txBody>
+                    <a:bodyPr/>
+                    <a:lstStyle/>
+                    <a:p>
+                      <a:pPr algn="ctr" latinLnBrk="1"/>
+                      <a:r>
+                        <a:rPr lang="en-US" altLang="ko-KR" sz="1200" dirty="0" smtClean="0"/>
+                        <a:t>UID</a:t>
+                      </a:r>
+                      <a:endParaRPr lang="ko-KR" altLang="en-US" sz="1200" dirty="0"/>
+                    </a:p>
+                  </a:txBody>
+                  <a:tcPr anchor="ctr"/>
+                </a:tc>
+                <a:tc>
+                  <a:txBody>
+                    <a:bodyPr/>
+                    <a:lstStyle/>
+                    <a:p>
+                      <a:pPr algn="ctr" latinLnBrk="1"/>
+                      <a:r>
+                        <a:rPr lang="en-US" altLang="ko-KR" sz="1200" dirty="0" smtClean="0"/>
+                        <a:t>String(-)</a:t>
+                      </a:r>
+                      <a:endParaRPr lang="ko-KR" altLang="en-US" sz="1200" dirty="0"/>
+                    </a:p>
+                  </a:txBody>
+                  <a:tcPr anchor="ctr"/>
+                </a:tc>
+                <a:tc>
+                  <a:txBody>
+                    <a:bodyPr/>
+                    <a:lstStyle/>
+                    <a:p>
+                      <a:pPr algn="ctr" latinLnBrk="1"/>
+                      <a:r>
+                        <a:rPr lang="ko-KR" altLang="en-US" sz="1200" dirty="0" smtClean="0"/>
+                        <a:t>각 사용자의 고유코드</a:t>
+                      </a:r>
+                      <a:endParaRPr lang="en-US" altLang="ko-KR" sz="1200" dirty="0" smtClean="0"/>
+                    </a:p>
+                  </a:txBody>
+                  <a:tcPr anchor="ctr"/>
+                </a:tc>
+              </a:tr>
+              <a:tr h="332901">
+                <a:tc>
+                  <a:txBody>
+                    <a:bodyPr/>
+                    <a:lstStyle/>
+                    <a:p>
+                      <a:pPr algn="ctr" latinLnBrk="1"/>
+                      <a:r>
+                        <a:rPr lang="en-US" altLang="ko-KR" sz="1200" dirty="0" smtClean="0"/>
+                        <a:t>Title</a:t>
+                      </a:r>
+                      <a:endParaRPr lang="ko-KR" altLang="en-US" sz="1200" dirty="0"/>
+                    </a:p>
+                  </a:txBody>
+                  <a:tcPr anchor="ctr">
+                    <a:solidFill>
+                      <a:schemeClr val="bg1">
+                        <a:lumMod val="95000"/>
+                      </a:schemeClr>
+                    </a:solidFill>
+                  </a:tcPr>
+                </a:tc>
+                <a:tc>
+                  <a:txBody>
+                    <a:bodyPr/>
+                    <a:lstStyle/>
+                    <a:p>
+                      <a:pPr algn="ctr" latinLnBrk="1"/>
+                      <a:r>
+                        <a:rPr lang="en-US" altLang="ko-KR" sz="1200" dirty="0" smtClean="0"/>
+                        <a:t>String</a:t>
+                      </a:r>
+                      <a:endParaRPr lang="ko-KR" altLang="en-US" sz="1200" dirty="0"/>
+                    </a:p>
+                  </a:txBody>
+                  <a:tcPr anchor="ctr">
+                    <a:solidFill>
+                      <a:schemeClr val="bg1">
+                        <a:lumMod val="95000"/>
+                      </a:schemeClr>
+                    </a:solidFill>
+                  </a:tcPr>
+                </a:tc>
+                <a:tc>
+                  <a:txBody>
+                    <a:bodyPr/>
+                    <a:lstStyle/>
+                    <a:p>
+                      <a:pPr algn="ctr" latinLnBrk="1"/>
+                      <a:r>
+                        <a:rPr lang="ko-KR" altLang="en-US" sz="1200" dirty="0" smtClean="0"/>
+                        <a:t>이름 지정</a:t>
+                      </a:r>
+                      <a:endParaRPr lang="en-US" altLang="ko-KR" sz="1200" dirty="0" smtClean="0"/>
+                    </a:p>
+                  </a:txBody>
+                  <a:tcPr anchor="ctr">
+                    <a:solidFill>
+                      <a:schemeClr val="bg1">
+                        <a:lumMod val="95000"/>
+                      </a:schemeClr>
+                    </a:solidFill>
+                  </a:tcPr>
+                </a:tc>
+              </a:tr>
+              <a:tr h="332901">
+                <a:tc>
+                  <a:txBody>
+                    <a:bodyPr/>
+                    <a:lstStyle/>
+                    <a:p>
+                      <a:pPr algn="ctr" latinLnBrk="1"/>
+                      <a:r>
+                        <a:rPr lang="en-US" altLang="ko-KR" sz="1200" dirty="0" smtClean="0"/>
+                        <a:t>Enabled</a:t>
+                      </a:r>
+                      <a:endParaRPr lang="ko-KR" altLang="en-US" sz="1200" dirty="0"/>
+                    </a:p>
+                  </a:txBody>
+                  <a:tcPr anchor="ctr"/>
+                </a:tc>
+                <a:tc>
+                  <a:txBody>
+                    <a:bodyPr/>
+                    <a:lstStyle/>
+                    <a:p>
+                      <a:pPr algn="ctr" latinLnBrk="1"/>
+                      <a:r>
+                        <a:rPr lang="en-US" altLang="ko-KR" sz="1200" dirty="0" err="1" smtClean="0"/>
+                        <a:t>Bool</a:t>
+                      </a:r>
+                      <a:endParaRPr lang="ko-KR" altLang="en-US" sz="1200" dirty="0"/>
+                    </a:p>
+                  </a:txBody>
+                  <a:tcPr anchor="ctr"/>
+                </a:tc>
+                <a:tc>
+                  <a:txBody>
+                    <a:bodyPr/>
+                    <a:lstStyle/>
+                    <a:p>
+                      <a:pPr algn="ctr" latinLnBrk="1"/>
+                      <a:r>
+                        <a:rPr lang="ko-KR" altLang="en-US" sz="1200" dirty="0" smtClean="0"/>
+                        <a:t>사용여부 </a:t>
+                      </a:r>
+                      <a:r>
+                        <a:rPr lang="en-US" altLang="ko-KR" sz="1200" dirty="0" smtClean="0"/>
+                        <a:t>(</a:t>
+                      </a:r>
+                      <a:r>
+                        <a:rPr lang="ko-KR" altLang="en-US" sz="1200" dirty="0" smtClean="0"/>
+                        <a:t>예약됨</a:t>
+                      </a:r>
+                      <a:r>
+                        <a:rPr lang="en-US" altLang="ko-KR" sz="1200" dirty="0" smtClean="0"/>
+                        <a:t>)</a:t>
+                      </a:r>
+                      <a:endParaRPr lang="ko-KR" altLang="en-US" sz="1200" dirty="0"/>
+                    </a:p>
+                  </a:txBody>
+                  <a:tcPr anchor="ctr"/>
+                </a:tc>
+              </a:tr>
+              <a:tr h="332901">
+                <a:tc>
+                  <a:txBody>
+                    <a:bodyPr/>
+                    <a:lstStyle/>
+                    <a:p>
+                      <a:pPr algn="ctr" latinLnBrk="1"/>
+                      <a:r>
+                        <a:rPr lang="en-US" altLang="ko-KR" sz="1200" dirty="0" err="1" smtClean="0"/>
+                        <a:t>One_time</a:t>
+                      </a:r>
+                      <a:endParaRPr lang="ko-KR" altLang="en-US" sz="1200" dirty="0"/>
+                    </a:p>
+                  </a:txBody>
+                  <a:tcPr anchor="ctr">
+                    <a:solidFill>
+                      <a:schemeClr val="bg1">
+                        <a:lumMod val="95000"/>
+                      </a:schemeClr>
+                    </a:solidFill>
+                  </a:tcPr>
+                </a:tc>
+                <a:tc>
+                  <a:txBody>
+                    <a:bodyPr/>
+                    <a:lstStyle/>
+                    <a:p>
+                      <a:pPr algn="ctr" latinLnBrk="1"/>
+                      <a:r>
+                        <a:rPr lang="en-US" altLang="ko-KR" sz="1200" dirty="0" err="1" smtClean="0"/>
+                        <a:t>Bool</a:t>
+                      </a:r>
+                      <a:endParaRPr lang="ko-KR" altLang="en-US" sz="1200" dirty="0"/>
+                    </a:p>
+                  </a:txBody>
+                  <a:tcPr anchor="ctr">
+                    <a:solidFill>
+                      <a:schemeClr val="bg1">
+                        <a:lumMod val="95000"/>
+                      </a:schemeClr>
+                    </a:solidFill>
+                  </a:tcPr>
+                </a:tc>
+                <a:tc>
+                  <a:txBody>
+                    <a:bodyPr/>
+                    <a:lstStyle/>
+                    <a:p>
+                      <a:pPr algn="ctr" latinLnBrk="1"/>
+                      <a:r>
+                        <a:rPr lang="ko-KR" altLang="en-US" sz="1200" dirty="0" smtClean="0"/>
+                        <a:t>단발성 작업인지 여부 </a:t>
+                      </a:r>
+                      <a:r>
+                        <a:rPr lang="en-US" altLang="ko-KR" sz="1200" dirty="0" smtClean="0"/>
+                        <a:t>(</a:t>
+                      </a:r>
+                      <a:r>
+                        <a:rPr lang="ko-KR" altLang="en-US" sz="1200" dirty="0" smtClean="0"/>
+                        <a:t>단발성인 경우 </a:t>
+                      </a:r>
+                      <a:r>
+                        <a:rPr lang="ko-KR" altLang="en-US" sz="1200" dirty="0" err="1" smtClean="0"/>
+                        <a:t>사용후</a:t>
+                      </a:r>
+                      <a:r>
+                        <a:rPr lang="ko-KR" altLang="en-US" sz="1200" dirty="0" smtClean="0"/>
+                        <a:t> </a:t>
+                      </a:r>
+                      <a:r>
+                        <a:rPr lang="en-US" altLang="ko-KR" sz="1200" dirty="0" smtClean="0"/>
+                        <a:t>enabled</a:t>
+                      </a:r>
+                      <a:r>
+                        <a:rPr lang="ko-KR" altLang="en-US" sz="1200" dirty="0" smtClean="0"/>
+                        <a:t>이 </a:t>
+                      </a:r>
+                      <a:r>
+                        <a:rPr lang="en-US" altLang="ko-KR" sz="1200" dirty="0" smtClean="0"/>
+                        <a:t>false</a:t>
+                      </a:r>
+                      <a:r>
+                        <a:rPr lang="ko-KR" altLang="en-US" sz="1200" dirty="0" smtClean="0"/>
+                        <a:t>로 바뀜</a:t>
+                      </a:r>
+                      <a:r>
+                        <a:rPr lang="en-US" altLang="ko-KR" sz="1200" dirty="0" smtClean="0"/>
+                        <a:t>)</a:t>
+                      </a:r>
+                      <a:endParaRPr lang="ko-KR" altLang="en-US" sz="1200" dirty="0"/>
+                    </a:p>
+                  </a:txBody>
+                  <a:tcPr anchor="ctr">
+                    <a:solidFill>
+                      <a:schemeClr val="bg1">
+                        <a:lumMod val="95000"/>
+                      </a:schemeClr>
+                    </a:solidFill>
+                  </a:tcPr>
+                </a:tc>
+              </a:tr>
+              <a:tr h="332901">
+                <a:tc>
+                  <a:txBody>
+                    <a:bodyPr/>
+                    <a:lstStyle/>
+                    <a:p>
+                      <a:pPr algn="ctr" latinLnBrk="1"/>
+                      <a:r>
+                        <a:rPr lang="en-US" altLang="ko-KR" sz="1200" dirty="0" smtClean="0"/>
+                        <a:t>Enabled</a:t>
+                      </a:r>
+                      <a:endParaRPr lang="ko-KR" altLang="en-US" sz="1200" dirty="0"/>
+                    </a:p>
+                  </a:txBody>
+                  <a:tcPr anchor="ctr"/>
+                </a:tc>
+                <a:tc>
+                  <a:txBody>
+                    <a:bodyPr/>
+                    <a:lstStyle/>
+                    <a:p>
+                      <a:pPr algn="ctr" latinLnBrk="1"/>
+                      <a:r>
+                        <a:rPr lang="en-US" altLang="ko-KR" sz="1200" dirty="0" err="1" smtClean="0"/>
+                        <a:t>Bool</a:t>
+                      </a:r>
+                      <a:endParaRPr lang="ko-KR" altLang="en-US" sz="1200" dirty="0"/>
+                    </a:p>
+                  </a:txBody>
+                  <a:tcPr anchor="ctr"/>
+                </a:tc>
+                <a:tc>
+                  <a:txBody>
+                    <a:bodyPr/>
+                    <a:lstStyle/>
+                    <a:p>
+                      <a:pPr algn="ctr" latinLnBrk="1"/>
+                      <a:r>
+                        <a:rPr lang="ko-KR" altLang="en-US" sz="1200" dirty="0" smtClean="0"/>
+                        <a:t>사용여부 </a:t>
+                      </a:r>
+                      <a:r>
+                        <a:rPr lang="en-US" altLang="ko-KR" sz="1200" dirty="0" smtClean="0"/>
+                        <a:t>(</a:t>
+                      </a:r>
+                      <a:r>
+                        <a:rPr lang="ko-KR" altLang="en-US" sz="1200" dirty="0" smtClean="0"/>
+                        <a:t>예약됨</a:t>
+                      </a:r>
+                      <a:r>
+                        <a:rPr lang="en-US" altLang="ko-KR" sz="1200" dirty="0" smtClean="0"/>
+                        <a:t>)</a:t>
+                      </a:r>
+                      <a:endParaRPr lang="ko-KR" altLang="en-US" sz="1200" dirty="0"/>
+                    </a:p>
+                  </a:txBody>
+                  <a:tcPr anchor="ctr"/>
+                </a:tc>
+              </a:tr>
+              <a:tr h="332901">
+                <a:tc>
+                  <a:txBody>
+                    <a:bodyPr/>
+                    <a:lstStyle/>
+                    <a:p>
+                      <a:pPr algn="ctr" latinLnBrk="1"/>
+                      <a:r>
+                        <a:rPr lang="en-US" altLang="ko-KR" sz="1200" dirty="0" err="1" smtClean="0"/>
+                        <a:t>Active_date</a:t>
+                      </a:r>
+                      <a:endParaRPr lang="ko-KR" altLang="en-US" sz="1200" dirty="0"/>
+                    </a:p>
+                  </a:txBody>
+                  <a:tcPr anchor="ctr">
+                    <a:solidFill>
+                      <a:schemeClr val="bg1">
+                        <a:lumMod val="95000"/>
+                      </a:schemeClr>
+                    </a:solidFill>
+                  </a:tcPr>
+                </a:tc>
+                <a:tc>
+                  <a:txBody>
+                    <a:bodyPr/>
+                    <a:lstStyle/>
+                    <a:p>
+                      <a:pPr algn="ctr" latinLnBrk="1"/>
+                      <a:r>
+                        <a:rPr lang="en-US" altLang="ko-KR" sz="1200" dirty="0" smtClean="0"/>
+                        <a:t>Timestamp</a:t>
+                      </a:r>
+                      <a:endParaRPr lang="ko-KR" altLang="en-US" sz="1200" dirty="0"/>
+                    </a:p>
+                  </a:txBody>
+                  <a:tcPr anchor="ctr">
+                    <a:solidFill>
+                      <a:schemeClr val="bg1">
+                        <a:lumMod val="95000"/>
+                      </a:schemeClr>
+                    </a:solidFill>
+                  </a:tcPr>
+                </a:tc>
+                <a:tc>
+                  <a:txBody>
+                    <a:bodyPr/>
+                    <a:lstStyle/>
+                    <a:p>
+                      <a:pPr algn="ctr" latinLnBrk="1"/>
+                      <a:r>
+                        <a:rPr lang="ko-KR" altLang="en-US" sz="1200" dirty="0" smtClean="0"/>
+                        <a:t>단발성 작업의 동작시간을 설정함</a:t>
+                      </a:r>
+                      <a:endParaRPr lang="ko-KR" altLang="en-US" sz="1200" dirty="0"/>
+                    </a:p>
+                  </a:txBody>
+                  <a:tcPr anchor="ctr">
+                    <a:solidFill>
+                      <a:schemeClr val="bg1">
+                        <a:lumMod val="95000"/>
+                      </a:schemeClr>
+                    </a:solidFill>
+                  </a:tcPr>
+                </a:tc>
+              </a:tr>
+              <a:tr h="332901">
+                <a:tc>
+                  <a:txBody>
+                    <a:bodyPr/>
+                    <a:lstStyle/>
+                    <a:p>
+                      <a:pPr algn="ctr" latinLnBrk="1"/>
+                      <a:r>
+                        <a:rPr lang="en-US" altLang="ko-KR" sz="1200" dirty="0" err="1" smtClean="0"/>
+                        <a:t>Daysofweek</a:t>
+                      </a:r>
+                      <a:endParaRPr lang="ko-KR" altLang="en-US" sz="1200" dirty="0"/>
+                    </a:p>
+                  </a:txBody>
+                  <a:tcPr anchor="ctr"/>
+                </a:tc>
+                <a:tc>
+                  <a:txBody>
+                    <a:bodyPr/>
+                    <a:lstStyle/>
+                    <a:p>
+                      <a:pPr algn="ctr" latinLnBrk="1"/>
+                      <a:r>
+                        <a:rPr lang="en-US" altLang="ko-KR" sz="1200" dirty="0" smtClean="0"/>
+                        <a:t>Array</a:t>
+                      </a:r>
+                      <a:endParaRPr lang="ko-KR" altLang="en-US" sz="1200" dirty="0"/>
+                    </a:p>
+                  </a:txBody>
+                  <a:tcPr anchor="ctr"/>
+                </a:tc>
+                <a:tc>
+                  <a:txBody>
+                    <a:bodyPr/>
+                    <a:lstStyle/>
+                    <a:p>
+                      <a:pPr algn="ctr" latinLnBrk="1"/>
+                      <a:r>
+                        <a:rPr lang="ko-KR" altLang="en-US" sz="1200" dirty="0" smtClean="0"/>
+                        <a:t>반복작업의 요일지정 </a:t>
+                      </a:r>
+                      <a:r>
+                        <a:rPr lang="en-US" altLang="ko-KR" sz="1200" dirty="0" smtClean="0"/>
+                        <a:t>(</a:t>
+                      </a:r>
+                      <a:r>
+                        <a:rPr lang="en-US" altLang="ko-KR" sz="1200" dirty="0" err="1" smtClean="0"/>
+                        <a:t>bool</a:t>
+                      </a:r>
+                      <a:r>
+                        <a:rPr lang="en-US" altLang="ko-KR" sz="1200" dirty="0" smtClean="0"/>
+                        <a:t>:</a:t>
+                      </a:r>
+                      <a:r>
+                        <a:rPr lang="ko-KR" altLang="en-US" sz="1200" dirty="0" err="1" smtClean="0"/>
+                        <a:t>월화수목금토일</a:t>
+                      </a:r>
+                      <a:r>
+                        <a:rPr lang="en-US" altLang="ko-KR" sz="1200" dirty="0" smtClean="0"/>
+                        <a:t>)</a:t>
+                      </a:r>
+                      <a:endParaRPr lang="ko-KR" altLang="en-US" sz="1200" dirty="0"/>
+                    </a:p>
+                  </a:txBody>
+                  <a:tcPr anchor="ctr"/>
+                </a:tc>
+              </a:tr>
+              <a:tr h="332901">
+                <a:tc>
+                  <a:txBody>
+                    <a:bodyPr/>
+                    <a:lstStyle/>
+                    <a:p>
+                      <a:pPr algn="ctr" latinLnBrk="1"/>
+                      <a:r>
+                        <a:rPr lang="en-US" altLang="ko-KR" sz="1200" dirty="0" err="1" smtClean="0"/>
+                        <a:t>Start_time</a:t>
+                      </a:r>
+                      <a:endParaRPr lang="ko-KR" altLang="en-US" sz="1200" dirty="0"/>
+                    </a:p>
+                  </a:txBody>
+                  <a:tcPr anchor="ctr">
+                    <a:solidFill>
+                      <a:schemeClr val="bg1">
+                        <a:lumMod val="95000"/>
+                      </a:schemeClr>
+                    </a:solidFill>
+                  </a:tcPr>
+                </a:tc>
+                <a:tc>
+                  <a:txBody>
+                    <a:bodyPr/>
+                    <a:lstStyle/>
+                    <a:p>
+                      <a:pPr algn="ctr" latinLnBrk="1"/>
+                      <a:r>
+                        <a:rPr lang="en-US" altLang="ko-KR" sz="1200" dirty="0" smtClean="0"/>
+                        <a:t>String</a:t>
+                      </a:r>
+                      <a:endParaRPr lang="ko-KR" altLang="en-US" sz="1200" dirty="0"/>
+                    </a:p>
+                  </a:txBody>
+                  <a:tcPr anchor="ctr">
+                    <a:solidFill>
+                      <a:schemeClr val="bg1">
+                        <a:lumMod val="95000"/>
+                      </a:schemeClr>
+                    </a:solidFill>
+                  </a:tcPr>
+                </a:tc>
+                <a:tc>
+                  <a:txBody>
+                    <a:bodyPr/>
+                    <a:lstStyle/>
+                    <a:p>
+                      <a:pPr algn="ctr" latinLnBrk="1"/>
+                      <a:r>
+                        <a:rPr lang="ko-KR" altLang="en-US" sz="1200" dirty="0" smtClean="0"/>
+                        <a:t>반복작업의 시작 시간 지정 </a:t>
+                      </a:r>
+                      <a:r>
+                        <a:rPr lang="en-US" altLang="ko-KR" sz="1200" dirty="0" smtClean="0"/>
+                        <a:t>ex)12</a:t>
+                      </a:r>
+                      <a:r>
+                        <a:rPr lang="ko-KR" altLang="en-US" sz="1200" dirty="0" smtClean="0"/>
+                        <a:t>시</a:t>
+                      </a:r>
+                      <a:r>
+                        <a:rPr lang="en-US" altLang="ko-KR" sz="1200" dirty="0" smtClean="0"/>
+                        <a:t>05</a:t>
+                      </a:r>
+                      <a:r>
+                        <a:rPr lang="ko-KR" altLang="en-US" sz="1200" dirty="0" err="1" smtClean="0"/>
+                        <a:t>분시작</a:t>
+                      </a:r>
+                      <a:r>
+                        <a:rPr lang="ko-KR" altLang="en-US" sz="1200" dirty="0" smtClean="0"/>
+                        <a:t> </a:t>
+                      </a:r>
+                      <a:r>
+                        <a:rPr lang="en-US" altLang="ko-KR" sz="1200" dirty="0" smtClean="0"/>
+                        <a:t>-&gt; 1205</a:t>
+                      </a:r>
+                      <a:endParaRPr lang="ko-KR" altLang="en-US" sz="1200" dirty="0"/>
+                    </a:p>
+                  </a:txBody>
+                  <a:tcPr anchor="ctr">
+                    <a:solidFill>
+                      <a:schemeClr val="bg1">
+                        <a:lumMod val="95000"/>
+                      </a:schemeClr>
+                    </a:solidFill>
+                  </a:tcPr>
+                </a:tc>
+              </a:tr>
+              <a:tr h="332901">
+                <a:tc>
+                  <a:txBody>
+                    <a:bodyPr/>
+                    <a:lstStyle/>
+                    <a:p>
+                      <a:pPr algn="ctr" latinLnBrk="1"/>
+                      <a:r>
+                        <a:rPr lang="en-US" altLang="ko-KR" sz="1200" dirty="0" err="1" smtClean="0"/>
+                        <a:t>End_time</a:t>
+                      </a:r>
+                      <a:endParaRPr lang="ko-KR" altLang="en-US" sz="1200" dirty="0"/>
+                    </a:p>
+                  </a:txBody>
+                  <a:tcPr anchor="ctr"/>
+                </a:tc>
+                <a:tc>
+                  <a:txBody>
+                    <a:bodyPr/>
+                    <a:lstStyle/>
+                    <a:p>
+                      <a:pPr algn="ctr" latinLnBrk="1"/>
+                      <a:r>
+                        <a:rPr lang="en-US" altLang="ko-KR" sz="1200" dirty="0" smtClean="0"/>
+                        <a:t>String</a:t>
+                      </a:r>
+                      <a:endParaRPr lang="ko-KR" altLang="en-US" sz="1200" dirty="0"/>
+                    </a:p>
+                  </a:txBody>
+                  <a:tcPr anchor="ctr"/>
+                </a:tc>
+                <a:tc>
+                  <a:txBody>
+                    <a:bodyPr/>
+                    <a:lstStyle/>
+                    <a:p>
+                      <a:pPr algn="ctr" latinLnBrk="1"/>
+                      <a:r>
+                        <a:rPr lang="ko-KR" altLang="en-US" sz="1200" dirty="0" smtClean="0"/>
+                        <a:t>반복작업의 종료 시간 시정 </a:t>
+                      </a:r>
+                      <a:r>
+                        <a:rPr lang="en-US" altLang="ko-KR" sz="1200" dirty="0" smtClean="0"/>
+                        <a:t>ex)13</a:t>
+                      </a:r>
+                      <a:r>
+                        <a:rPr lang="ko-KR" altLang="en-US" sz="1200" dirty="0" smtClean="0"/>
+                        <a:t>시</a:t>
+                      </a:r>
+                      <a:r>
+                        <a:rPr lang="en-US" altLang="ko-KR" sz="1200" dirty="0" smtClean="0"/>
+                        <a:t>10</a:t>
+                      </a:r>
+                      <a:r>
+                        <a:rPr lang="ko-KR" altLang="en-US" sz="1200" dirty="0" err="1" smtClean="0"/>
+                        <a:t>분종료</a:t>
+                      </a:r>
+                      <a:r>
+                        <a:rPr lang="ko-KR" altLang="en-US" sz="1200" dirty="0" smtClean="0"/>
+                        <a:t> </a:t>
+                      </a:r>
+                      <a:r>
+                        <a:rPr lang="en-US" altLang="ko-KR" sz="1200" dirty="0" smtClean="0"/>
+                        <a:t>-&gt; 1310</a:t>
+                      </a:r>
+                      <a:endParaRPr lang="ko-KR" altLang="en-US" sz="1200" dirty="0"/>
+                    </a:p>
+                  </a:txBody>
+                  <a:tcPr anchor="ctr"/>
+                </a:tc>
+              </a:tr>
+              <a:tr h="332901">
+                <a:tc>
+                  <a:txBody>
+                    <a:bodyPr/>
+                    <a:lstStyle/>
+                    <a:p>
+                      <a:pPr algn="ctr" latinLnBrk="1"/>
+                      <a:r>
+                        <a:rPr lang="en-US" altLang="ko-KR" sz="1200" dirty="0" err="1" smtClean="0"/>
+                        <a:t>Devcie_aircon</a:t>
+                      </a:r>
+                      <a:endParaRPr lang="ko-KR" altLang="en-US" sz="1200" dirty="0"/>
+                    </a:p>
+                  </a:txBody>
+                  <a:tcPr anchor="ctr">
+                    <a:solidFill>
+                      <a:schemeClr val="bg1">
+                        <a:lumMod val="95000"/>
+                      </a:schemeClr>
+                    </a:solidFill>
+                  </a:tcPr>
+                </a:tc>
+                <a:tc>
+                  <a:txBody>
+                    <a:bodyPr/>
+                    <a:lstStyle/>
+                    <a:p>
+                      <a:pPr algn="ctr" latinLnBrk="1"/>
+                      <a:r>
+                        <a:rPr lang="en-US" altLang="ko-KR" sz="1200" dirty="0" smtClean="0"/>
+                        <a:t>Array</a:t>
+                      </a:r>
+                      <a:endParaRPr lang="ko-KR" altLang="en-US" sz="1200" dirty="0"/>
+                    </a:p>
+                  </a:txBody>
+                  <a:tcPr anchor="ctr">
+                    <a:solidFill>
+                      <a:schemeClr val="bg1">
+                        <a:lumMod val="95000"/>
+                      </a:schemeClr>
+                    </a:solidFill>
+                  </a:tcPr>
+                </a:tc>
+                <a:tc>
+                  <a:txBody>
+                    <a:bodyPr/>
+                    <a:lstStyle/>
+                    <a:p>
+                      <a:pPr algn="ctr" latinLnBrk="1"/>
+                      <a:r>
+                        <a:rPr lang="ko-KR" altLang="en-US" sz="1200" dirty="0" smtClean="0"/>
+                        <a:t>동작여부</a:t>
+                      </a:r>
+                      <a:r>
+                        <a:rPr lang="en-US" altLang="ko-KR" sz="1200" dirty="0" smtClean="0"/>
+                        <a:t>(</a:t>
+                      </a:r>
+                      <a:r>
+                        <a:rPr lang="en-US" altLang="ko-KR" sz="1200" dirty="0" err="1" smtClean="0"/>
+                        <a:t>bool</a:t>
+                      </a:r>
+                      <a:r>
+                        <a:rPr lang="en-US" altLang="ko-KR" sz="1200" dirty="0" smtClean="0"/>
+                        <a:t>),</a:t>
+                      </a:r>
+                      <a:r>
+                        <a:rPr lang="en-US" altLang="ko-KR" sz="1200" baseline="0" dirty="0" smtClean="0"/>
+                        <a:t> </a:t>
+                      </a:r>
+                      <a:r>
+                        <a:rPr lang="ko-KR" altLang="en-US" sz="1200" baseline="0" dirty="0" smtClean="0"/>
+                        <a:t>설정온도</a:t>
+                      </a:r>
+                      <a:r>
+                        <a:rPr lang="en-US" altLang="ko-KR" sz="1200" baseline="0" dirty="0" smtClean="0"/>
+                        <a:t>(number), </a:t>
+                      </a:r>
+                      <a:r>
+                        <a:rPr lang="ko-KR" altLang="en-US" sz="1200" baseline="0" dirty="0" err="1" smtClean="0"/>
+                        <a:t>풍량</a:t>
+                      </a:r>
+                      <a:r>
+                        <a:rPr lang="en-US" altLang="ko-KR" sz="1200" baseline="0" dirty="0" smtClean="0"/>
+                        <a:t>(number)</a:t>
+                      </a:r>
+                      <a:endParaRPr lang="ko-KR" altLang="en-US" sz="1200" dirty="0"/>
+                    </a:p>
+                  </a:txBody>
+                  <a:tcPr anchor="ctr">
+                    <a:solidFill>
+                      <a:schemeClr val="bg1">
+                        <a:lumMod val="95000"/>
+                      </a:schemeClr>
+                    </a:solidFill>
+                  </a:tcPr>
+                </a:tc>
+              </a:tr>
+              <a:tr h="332901">
+                <a:tc>
+                  <a:txBody>
+                    <a:bodyPr/>
+                    <a:lstStyle/>
+                    <a:p>
+                      <a:pPr algn="ctr" latinLnBrk="1"/>
+                      <a:r>
+                        <a:rPr lang="en-US" altLang="ko-KR" sz="1200" dirty="0" err="1" smtClean="0"/>
+                        <a:t>Device_light</a:t>
+                      </a:r>
+                      <a:endParaRPr lang="ko-KR" altLang="en-US" sz="1200" dirty="0"/>
+                    </a:p>
+                  </a:txBody>
+                  <a:tcPr anchor="ctr"/>
+                </a:tc>
+                <a:tc>
+                  <a:txBody>
+                    <a:bodyPr/>
+                    <a:lstStyle/>
+                    <a:p>
+                      <a:pPr algn="ctr" latinLnBrk="1"/>
+                      <a:r>
+                        <a:rPr lang="en-US" altLang="ko-KR" sz="1200" dirty="0" smtClean="0"/>
+                        <a:t>Array</a:t>
+                      </a:r>
+                      <a:endParaRPr lang="ko-KR" altLang="en-US" sz="1200" dirty="0"/>
+                    </a:p>
+                  </a:txBody>
+                  <a:tcPr anchor="ctr"/>
+                </a:tc>
+                <a:tc>
+                  <a:txBody>
+                    <a:bodyPr/>
+                    <a:lstStyle/>
+                    <a:p>
+                      <a:pPr algn="ctr" latinLnBrk="1"/>
+                      <a:r>
+                        <a:rPr lang="ko-KR" altLang="en-US" sz="1200" dirty="0" smtClean="0"/>
+                        <a:t>동작여부</a:t>
+                      </a:r>
+                      <a:r>
+                        <a:rPr lang="en-US" altLang="ko-KR" sz="1200" dirty="0" smtClean="0"/>
+                        <a:t>(</a:t>
+                      </a:r>
+                      <a:r>
+                        <a:rPr lang="en-US" altLang="ko-KR" sz="1200" dirty="0" err="1" smtClean="0"/>
+                        <a:t>bool</a:t>
+                      </a:r>
+                      <a:r>
+                        <a:rPr lang="en-US" altLang="ko-KR" sz="1200" dirty="0" smtClean="0"/>
+                        <a:t>), </a:t>
+                      </a:r>
+                      <a:r>
+                        <a:rPr lang="ko-KR" altLang="en-US" sz="1200" dirty="0" smtClean="0"/>
+                        <a:t>밝기</a:t>
+                      </a:r>
+                      <a:r>
+                        <a:rPr lang="en-US" altLang="ko-KR" sz="1200" dirty="0" smtClean="0"/>
+                        <a:t>(number), </a:t>
+                      </a:r>
+                      <a:r>
+                        <a:rPr lang="ko-KR" altLang="en-US" sz="1200" dirty="0" smtClean="0"/>
+                        <a:t>색상</a:t>
+                      </a:r>
+                      <a:r>
+                        <a:rPr lang="en-US" altLang="ko-KR" sz="1200" dirty="0" smtClean="0"/>
+                        <a:t>(string)</a:t>
+                      </a:r>
+                      <a:endParaRPr lang="ko-KR" altLang="en-US" sz="1200" dirty="0"/>
+                    </a:p>
+                  </a:txBody>
+                  <a:tcPr anchor="ctr"/>
+                </a:tc>
+              </a:tr>
+              <a:tr h="332901">
+                <a:tc>
+                  <a:txBody>
+                    <a:bodyPr/>
+                    <a:lstStyle/>
+                    <a:p>
+                      <a:pPr algn="ctr" latinLnBrk="1"/>
+                      <a:r>
+                        <a:rPr lang="en-US" altLang="ko-KR" sz="1200" dirty="0" err="1" smtClean="0"/>
+                        <a:t>Device_gas</a:t>
+                      </a:r>
+                      <a:endParaRPr lang="ko-KR" altLang="en-US" sz="1200" dirty="0"/>
+                    </a:p>
+                  </a:txBody>
+                  <a:tcPr anchor="ctr">
+                    <a:solidFill>
+                      <a:schemeClr val="bg1">
+                        <a:lumMod val="95000"/>
+                      </a:schemeClr>
+                    </a:solidFill>
+                  </a:tcPr>
+                </a:tc>
+                <a:tc>
+                  <a:txBody>
+                    <a:bodyPr/>
+                    <a:lstStyle/>
+                    <a:p>
+                      <a:pPr algn="ctr" latinLnBrk="1"/>
+                      <a:r>
+                        <a:rPr lang="en-US" altLang="ko-KR" sz="1200" dirty="0" smtClean="0"/>
+                        <a:t>Array</a:t>
+                      </a:r>
+                      <a:endParaRPr lang="ko-KR" altLang="en-US" sz="1200" dirty="0"/>
+                    </a:p>
+                  </a:txBody>
+                  <a:tcPr anchor="ctr">
+                    <a:solidFill>
+                      <a:schemeClr val="bg1">
+                        <a:lumMod val="95000"/>
+                      </a:schemeClr>
+                    </a:solidFill>
+                  </a:tcPr>
+                </a:tc>
+                <a:tc>
+                  <a:txBody>
+                    <a:bodyPr/>
+                    <a:lstStyle/>
+                    <a:p>
+                      <a:pPr algn="ctr" latinLnBrk="1"/>
+                      <a:r>
+                        <a:rPr lang="ko-KR" altLang="en-US" sz="1200" dirty="0" smtClean="0"/>
+                        <a:t>사용여부</a:t>
+                      </a:r>
+                      <a:r>
+                        <a:rPr lang="en-US" altLang="ko-KR" sz="1200" dirty="0" smtClean="0"/>
+                        <a:t>(</a:t>
+                      </a:r>
+                      <a:r>
+                        <a:rPr lang="en-US" altLang="ko-KR" sz="1200" dirty="0" err="1" smtClean="0"/>
+                        <a:t>bool</a:t>
+                      </a:r>
+                      <a:r>
+                        <a:rPr lang="en-US" altLang="ko-KR" sz="1200" dirty="0" smtClean="0"/>
+                        <a:t>)</a:t>
+                      </a:r>
+                      <a:endParaRPr lang="ko-KR" altLang="en-US" sz="1200" dirty="0"/>
+                    </a:p>
+                  </a:txBody>
+                  <a:tcPr anchor="ctr">
+                    <a:solidFill>
+                      <a:schemeClr val="bg1">
+                        <a:lumMod val="95000"/>
+                      </a:schemeClr>
+                    </a:solidFill>
+                  </a:tcPr>
+                </a:tc>
+              </a:tr>
+              <a:tr h="462888">
+                <a:tc>
+                  <a:txBody>
+                    <a:bodyPr/>
+                    <a:lstStyle/>
+                    <a:p>
+                      <a:pPr algn="ctr" latinLnBrk="1"/>
+                      <a:r>
+                        <a:rPr lang="en-US" altLang="ko-KR" sz="1200" dirty="0" err="1" smtClean="0"/>
+                        <a:t>Device_window</a:t>
+                      </a:r>
+                      <a:endParaRPr lang="ko-KR" altLang="en-US" sz="1200" dirty="0"/>
+                    </a:p>
+                  </a:txBody>
+                  <a:tcPr anchor="ctr"/>
+                </a:tc>
+                <a:tc>
+                  <a:txBody>
+                    <a:bodyPr/>
+                    <a:lstStyle/>
+                    <a:p>
+                      <a:pPr algn="ctr" latinLnBrk="1"/>
+                      <a:r>
+                        <a:rPr lang="en-US" altLang="ko-KR" sz="1200" dirty="0" smtClean="0"/>
+                        <a:t>Array</a:t>
+                      </a:r>
+                      <a:endParaRPr lang="ko-KR" altLang="en-US" sz="1200" dirty="0"/>
+                    </a:p>
+                  </a:txBody>
+                  <a:tcPr anchor="ctr"/>
+                </a:tc>
+                <a:tc>
+                  <a:txBody>
+                    <a:bodyPr/>
+                    <a:lstStyle/>
+                    <a:p>
+                      <a:pPr algn="ctr" latinLnBrk="1"/>
+                      <a:r>
+                        <a:rPr lang="ko-KR" altLang="en-US" sz="1200" dirty="0" err="1" smtClean="0"/>
+                        <a:t>열림닫힘여부</a:t>
+                      </a:r>
+                      <a:r>
+                        <a:rPr lang="en-US" altLang="ko-KR" sz="1200" dirty="0" smtClean="0"/>
+                        <a:t>(</a:t>
+                      </a:r>
+                      <a:r>
+                        <a:rPr lang="en-US" altLang="ko-KR" sz="1200" dirty="0" err="1" smtClean="0"/>
+                        <a:t>bool</a:t>
+                      </a:r>
+                      <a:r>
+                        <a:rPr lang="en-US" altLang="ko-KR" sz="1200" dirty="0" smtClean="0"/>
+                        <a:t>)</a:t>
+                      </a:r>
+                      <a:endParaRPr lang="ko-KR" altLang="en-US" sz="1200" dirty="0"/>
+                    </a:p>
+                  </a:txBody>
+                  <a:tcPr anchor="ctr"/>
+                </a:tc>
+              </a:tr>
+            </a:tbl>
+          </a:graphicData>
+        </a:graphic>
+      </p:graphicFrame>
+      <p:sp>
+        <p:nvSpPr>
+          <p:cNvPr id="4" name="TextBox 3"/>
+          <p:cNvSpPr txBox="1"/>
+          <p:nvPr/>
+        </p:nvSpPr>
+        <p:spPr>
+          <a:xfrm>
+            <a:off x="944088" y="1442852"/>
+            <a:ext cx="7196201" cy="369332"/>
+          </a:xfrm>
+          <a:prstGeom prst="rect">
+            <a:avLst/>
+          </a:prstGeom>
+          <a:noFill/>
+        </p:spPr>
+        <p:txBody>
+          <a:bodyPr wrap="none" rtlCol="0">
+            <a:spAutoFit/>
+          </a:bodyPr>
+          <a:lstStyle/>
+          <a:p>
+            <a:r>
+              <a:rPr lang="ko-KR" altLang="en-US" dirty="0" smtClean="0"/>
+              <a:t>가전동작에 </a:t>
+            </a:r>
+            <a:r>
+              <a:rPr lang="ko-KR" altLang="en-US" dirty="0" smtClean="0"/>
+              <a:t>대한</a:t>
+            </a:r>
+            <a:r>
+              <a:rPr lang="en-US" altLang="ko-KR" dirty="0"/>
+              <a:t> </a:t>
+            </a:r>
+            <a:r>
+              <a:rPr lang="ko-KR" altLang="en-US" dirty="0" smtClean="0"/>
+              <a:t>모드들을 기억함</a:t>
+            </a:r>
+            <a:r>
+              <a:rPr lang="en-US" altLang="ko-KR" dirty="0" smtClean="0"/>
+              <a:t>.</a:t>
+            </a:r>
+            <a:r>
+              <a:rPr lang="ko-KR" altLang="en-US" dirty="0" smtClean="0"/>
+              <a:t> </a:t>
+            </a:r>
+            <a:r>
+              <a:rPr lang="ko-KR" altLang="en-US" dirty="0" smtClean="0"/>
+              <a:t> </a:t>
+            </a:r>
+            <a:r>
+              <a:rPr lang="en-US" altLang="ko-KR" dirty="0" smtClean="0"/>
+              <a:t>(</a:t>
+            </a:r>
+            <a:r>
+              <a:rPr lang="ko-KR" altLang="en-US" dirty="0" smtClean="0"/>
+              <a:t>기존 </a:t>
+            </a:r>
+            <a:r>
+              <a:rPr lang="ko-KR" altLang="en-US" dirty="0" err="1" smtClean="0"/>
+              <a:t>홈모드</a:t>
+            </a:r>
+            <a:r>
+              <a:rPr lang="ko-KR" altLang="en-US" dirty="0" smtClean="0"/>
+              <a:t> </a:t>
+            </a:r>
+            <a:r>
+              <a:rPr lang="en-US" altLang="ko-KR" dirty="0" smtClean="0"/>
+              <a:t>+ </a:t>
+            </a:r>
+            <a:r>
+              <a:rPr lang="ko-KR" altLang="en-US" dirty="0" err="1" smtClean="0"/>
+              <a:t>스케쥴</a:t>
+            </a:r>
+            <a:r>
+              <a:rPr lang="ko-KR" altLang="en-US" dirty="0" smtClean="0"/>
+              <a:t> </a:t>
+            </a:r>
+            <a:r>
+              <a:rPr lang="en-US" altLang="ko-KR" dirty="0" smtClean="0"/>
+              <a:t>DB </a:t>
+            </a:r>
+            <a:r>
+              <a:rPr lang="ko-KR" altLang="en-US" dirty="0" smtClean="0"/>
+              <a:t>통합</a:t>
+            </a:r>
+            <a:r>
+              <a:rPr lang="en-US" altLang="ko-KR" dirty="0" smtClean="0"/>
+              <a:t>)</a:t>
+            </a:r>
+            <a:endParaRPr lang="ko-KR" altLang="en-US" dirty="0"/>
+          </a:p>
+        </p:txBody>
+      </p:sp>
+      <p:sp>
+        <p:nvSpPr>
+          <p:cNvPr id="7" name="TextBox 6"/>
+          <p:cNvSpPr txBox="1"/>
+          <p:nvPr/>
+        </p:nvSpPr>
+        <p:spPr>
+          <a:xfrm>
+            <a:off x="-14892" y="2692400"/>
+            <a:ext cx="1271502" cy="430887"/>
+          </a:xfrm>
+          <a:prstGeom prst="rect">
+            <a:avLst/>
+          </a:prstGeom>
+          <a:noFill/>
+        </p:spPr>
+        <p:txBody>
+          <a:bodyPr wrap="none" rtlCol="0">
+            <a:spAutoFit/>
+          </a:bodyPr>
+          <a:lstStyle/>
+          <a:p>
+            <a:r>
+              <a:rPr lang="en-US" altLang="ko-KR" sz="1100" b="1" dirty="0" smtClean="0">
+                <a:solidFill>
+                  <a:srgbClr val="00B0F0"/>
+                </a:solidFill>
+              </a:rPr>
+              <a:t>Document ID </a:t>
+            </a:r>
+            <a:r>
+              <a:rPr lang="ko-KR" altLang="en-US" sz="1100" b="1" dirty="0" smtClean="0">
+                <a:solidFill>
+                  <a:srgbClr val="00B0F0"/>
+                </a:solidFill>
+              </a:rPr>
+              <a:t>→</a:t>
+            </a:r>
+            <a:endParaRPr lang="en-US" altLang="ko-KR" sz="1100" b="1" dirty="0" smtClean="0">
+              <a:solidFill>
+                <a:srgbClr val="00B0F0"/>
+              </a:solidFill>
+            </a:endParaRPr>
+          </a:p>
+          <a:p>
+            <a:r>
+              <a:rPr lang="en-US" altLang="ko-KR" sz="1100" b="1" dirty="0" smtClean="0">
+                <a:solidFill>
+                  <a:srgbClr val="00B0F0"/>
+                </a:solidFill>
+              </a:rPr>
+              <a:t>(</a:t>
+            </a:r>
+            <a:r>
+              <a:rPr lang="en-US" altLang="ko-KR" sz="1100" b="1" dirty="0" err="1" smtClean="0">
+                <a:solidFill>
+                  <a:srgbClr val="00B0F0"/>
+                </a:solidFill>
+              </a:rPr>
+              <a:t>PrimaryKey</a:t>
+            </a:r>
+            <a:r>
+              <a:rPr lang="en-US" altLang="ko-KR" sz="1100" b="1" dirty="0" smtClean="0">
+                <a:solidFill>
+                  <a:srgbClr val="00B0F0"/>
+                </a:solidFill>
+              </a:rPr>
+              <a:t>)</a:t>
+            </a:r>
+            <a:endParaRPr lang="ko-KR" altLang="en-US" sz="1100" b="1" dirty="0">
+              <a:solidFill>
+                <a:srgbClr val="00B0F0"/>
+              </a:solidFill>
+            </a:endParaRPr>
+          </a:p>
+        </p:txBody>
+      </p:sp>
+    </p:spTree>
+    <p:extLst>
+      <p:ext uri="{BB962C8B-B14F-4D97-AF65-F5344CB8AC3E}">
+        <p14:creationId xmlns:p14="http://schemas.microsoft.com/office/powerpoint/2010/main" val="238791827"/>
       </p:ext>
     </p:extLst>
   </p:cSld>
@@ -6115,1155 +7342,8 @@
           <a:lstStyle/>
           <a:p>
             <a:r>
-              <a:rPr lang="ko-KR" altLang="en-US" dirty="0" err="1" smtClean="0"/>
-              <a:t>파이어베이스</a:t>
-            </a:r>
-            <a:r>
-              <a:rPr lang="ko-KR" altLang="en-US" dirty="0" smtClean="0"/>
-              <a:t> 구축 </a:t>
-            </a:r>
-            <a:r>
               <a:rPr lang="en-US" altLang="ko-KR" dirty="0" smtClean="0"/>
-              <a:t>(</a:t>
-            </a:r>
-            <a:r>
-              <a:rPr lang="en-US" altLang="ko-KR" dirty="0" err="1" smtClean="0"/>
-              <a:t>FireStore</a:t>
-            </a:r>
-            <a:r>
-              <a:rPr lang="en-US" altLang="ko-KR" dirty="0" smtClean="0"/>
-              <a:t>)</a:t>
-            </a:r>
-            <a:endParaRPr lang="ko-KR" altLang="en-US" dirty="0"/>
-          </a:p>
-        </p:txBody>
-      </p:sp>
-      <p:graphicFrame>
-        <p:nvGraphicFramePr>
-          <p:cNvPr id="3" name="표 2"/>
-          <p:cNvGraphicFramePr>
-            <a:graphicFrameLocks noGrp="1"/>
-          </p:cNvGraphicFramePr>
-          <p:nvPr>
-            <p:extLst>
-              <p:ext uri="{D42A27DB-BD31-4B8C-83A1-F6EECF244321}">
-                <p14:modId xmlns:p14="http://schemas.microsoft.com/office/powerpoint/2010/main" val="1316658878"/>
-              </p:ext>
-            </p:extLst>
-          </p:nvPr>
-        </p:nvGraphicFramePr>
-        <p:xfrm>
-          <a:off x="992908" y="2173980"/>
-          <a:ext cx="9908639" cy="4512568"/>
-        </p:xfrm>
-        <a:graphic>
-          <a:graphicData uri="http://schemas.openxmlformats.org/drawingml/2006/table">
-            <a:tbl>
-              <a:tblPr firstRow="1" bandRow="1">
-                <a:tableStyleId>{5940675A-B579-460E-94D1-54222C63F5DA}</a:tableStyleId>
-              </a:tblPr>
-              <a:tblGrid>
-                <a:gridCol w="1824176"/>
-                <a:gridCol w="2055989"/>
-                <a:gridCol w="6028474"/>
-              </a:tblGrid>
-              <a:tr h="481840">
-                <a:tc>
-                  <a:txBody>
-                    <a:bodyPr/>
-                    <a:lstStyle/>
-                    <a:p>
-                      <a:pPr algn="ctr" latinLnBrk="1"/>
-                      <a:r>
-                        <a:rPr lang="ko-KR" altLang="en-US" sz="1200" b="1" dirty="0" err="1" smtClean="0"/>
-                        <a:t>필드명</a:t>
-                      </a:r>
-                      <a:endParaRPr lang="ko-KR" altLang="en-US" sz="1200" b="1" dirty="0"/>
-                    </a:p>
-                  </a:txBody>
-                  <a:tcPr anchor="ctr">
-                    <a:solidFill>
-                      <a:schemeClr val="bg1">
-                        <a:lumMod val="95000"/>
-                      </a:schemeClr>
-                    </a:solidFill>
-                  </a:tcPr>
-                </a:tc>
-                <a:tc>
-                  <a:txBody>
-                    <a:bodyPr/>
-                    <a:lstStyle/>
-                    <a:p>
-                      <a:pPr algn="ctr" latinLnBrk="1"/>
-                      <a:r>
-                        <a:rPr lang="ko-KR" altLang="en-US" sz="1200" b="1" dirty="0" smtClean="0"/>
-                        <a:t>타입 </a:t>
-                      </a:r>
-                      <a:r>
-                        <a:rPr lang="en-US" altLang="ko-KR" sz="1200" b="1" dirty="0" smtClean="0"/>
-                        <a:t>(</a:t>
-                      </a:r>
-                      <a:r>
-                        <a:rPr lang="ko-KR" altLang="en-US" sz="1200" b="1" dirty="0" smtClean="0"/>
-                        <a:t>암시적</a:t>
-                      </a:r>
-                      <a:r>
-                        <a:rPr lang="en-US" altLang="ko-KR" sz="1200" b="1" dirty="0" smtClean="0"/>
-                        <a:t>)</a:t>
-                      </a:r>
-                      <a:endParaRPr lang="ko-KR" altLang="en-US" sz="1200" b="1" dirty="0"/>
-                    </a:p>
-                  </a:txBody>
-                  <a:tcPr anchor="ctr">
-                    <a:solidFill>
-                      <a:schemeClr val="bg1">
-                        <a:lumMod val="95000"/>
-                      </a:schemeClr>
-                    </a:solidFill>
-                  </a:tcPr>
-                </a:tc>
-                <a:tc>
-                  <a:txBody>
-                    <a:bodyPr/>
-                    <a:lstStyle/>
-                    <a:p>
-                      <a:pPr algn="ctr" latinLnBrk="1"/>
-                      <a:r>
-                        <a:rPr lang="ko-KR" altLang="en-US" sz="1200" b="1" dirty="0" smtClean="0"/>
-                        <a:t>설명</a:t>
-                      </a:r>
-                      <a:endParaRPr lang="ko-KR" altLang="en-US" sz="1200" b="1" dirty="0"/>
-                    </a:p>
-                  </a:txBody>
-                  <a:tcPr anchor="ctr">
-                    <a:solidFill>
-                      <a:schemeClr val="bg1">
-                        <a:lumMod val="95000"/>
-                      </a:schemeClr>
-                    </a:solidFill>
-                  </a:tcPr>
-                </a:tc>
-              </a:tr>
-              <a:tr h="310056">
-                <a:tc>
-                  <a:txBody>
-                    <a:bodyPr/>
-                    <a:lstStyle/>
-                    <a:p>
-                      <a:pPr algn="ctr" latinLnBrk="1"/>
-                      <a:r>
-                        <a:rPr lang="en-US" altLang="ko-KR" sz="1200" dirty="0" smtClean="0"/>
-                        <a:t>UID</a:t>
-                      </a:r>
-                      <a:endParaRPr lang="ko-KR" altLang="en-US" sz="1200" dirty="0"/>
-                    </a:p>
-                  </a:txBody>
-                  <a:tcPr anchor="ctr"/>
-                </a:tc>
-                <a:tc>
-                  <a:txBody>
-                    <a:bodyPr/>
-                    <a:lstStyle/>
-                    <a:p>
-                      <a:pPr algn="ctr" latinLnBrk="1"/>
-                      <a:r>
-                        <a:rPr lang="en-US" altLang="ko-KR" sz="1200" dirty="0" smtClean="0"/>
-                        <a:t>String(-)</a:t>
-                      </a:r>
-                      <a:endParaRPr lang="ko-KR" altLang="en-US" sz="1200" dirty="0"/>
-                    </a:p>
-                  </a:txBody>
-                  <a:tcPr anchor="ctr"/>
-                </a:tc>
-                <a:tc>
-                  <a:txBody>
-                    <a:bodyPr/>
-                    <a:lstStyle/>
-                    <a:p>
-                      <a:pPr algn="ctr" latinLnBrk="1"/>
-                      <a:r>
-                        <a:rPr lang="ko-KR" altLang="en-US" sz="1200" dirty="0" smtClean="0"/>
-                        <a:t>각 사용자의 고유코드</a:t>
-                      </a:r>
-                      <a:endParaRPr lang="en-US" altLang="ko-KR" sz="1050" dirty="0" smtClean="0"/>
-                    </a:p>
-                  </a:txBody>
-                  <a:tcPr anchor="ctr"/>
-                </a:tc>
-              </a:tr>
-              <a:tr h="310056">
-                <a:tc>
-                  <a:txBody>
-                    <a:bodyPr/>
-                    <a:lstStyle/>
-                    <a:p>
-                      <a:pPr algn="ctr" latinLnBrk="1"/>
-                      <a:r>
-                        <a:rPr lang="en-US" altLang="ko-KR" sz="1200" dirty="0" smtClean="0"/>
-                        <a:t>Title</a:t>
-                      </a:r>
-                      <a:endParaRPr lang="ko-KR" altLang="en-US" sz="1200" dirty="0"/>
-                    </a:p>
-                  </a:txBody>
-                  <a:tcPr anchor="ctr"/>
-                </a:tc>
-                <a:tc>
-                  <a:txBody>
-                    <a:bodyPr/>
-                    <a:lstStyle/>
-                    <a:p>
-                      <a:pPr algn="ctr" latinLnBrk="1"/>
-                      <a:r>
-                        <a:rPr lang="en-US" altLang="ko-KR" sz="1200" dirty="0" smtClean="0"/>
-                        <a:t>String</a:t>
-                      </a:r>
-                      <a:endParaRPr lang="ko-KR" altLang="en-US" sz="1200" dirty="0"/>
-                    </a:p>
-                  </a:txBody>
-                  <a:tcPr anchor="ctr"/>
-                </a:tc>
-                <a:tc>
-                  <a:txBody>
-                    <a:bodyPr/>
-                    <a:lstStyle/>
-                    <a:p>
-                      <a:pPr algn="ctr" latinLnBrk="1"/>
-                      <a:r>
-                        <a:rPr lang="ko-KR" altLang="en-US" sz="1050" dirty="0" smtClean="0"/>
-                        <a:t>이름 지정</a:t>
-                      </a:r>
-                      <a:endParaRPr lang="en-US" altLang="ko-KR" sz="1050" dirty="0" smtClean="0"/>
-                    </a:p>
-                  </a:txBody>
-                  <a:tcPr anchor="ctr"/>
-                </a:tc>
-              </a:tr>
-              <a:tr h="310056">
-                <a:tc>
-                  <a:txBody>
-                    <a:bodyPr/>
-                    <a:lstStyle/>
-                    <a:p>
-                      <a:pPr algn="ctr" latinLnBrk="1"/>
-                      <a:r>
-                        <a:rPr lang="en-US" altLang="ko-KR" sz="1200" dirty="0" smtClean="0"/>
-                        <a:t>Enabled</a:t>
-                      </a:r>
-                      <a:endParaRPr lang="ko-KR" altLang="en-US" sz="1200" dirty="0"/>
-                    </a:p>
-                  </a:txBody>
-                  <a:tcPr anchor="ctr"/>
-                </a:tc>
-                <a:tc>
-                  <a:txBody>
-                    <a:bodyPr/>
-                    <a:lstStyle/>
-                    <a:p>
-                      <a:pPr algn="ctr" latinLnBrk="1"/>
-                      <a:r>
-                        <a:rPr lang="en-US" altLang="ko-KR" sz="1200" dirty="0" err="1" smtClean="0"/>
-                        <a:t>Bool</a:t>
-                      </a:r>
-                      <a:endParaRPr lang="ko-KR" altLang="en-US" sz="1200" dirty="0"/>
-                    </a:p>
-                  </a:txBody>
-                  <a:tcPr anchor="ctr"/>
-                </a:tc>
-                <a:tc>
-                  <a:txBody>
-                    <a:bodyPr/>
-                    <a:lstStyle/>
-                    <a:p>
-                      <a:pPr algn="ctr" latinLnBrk="1"/>
-                      <a:r>
-                        <a:rPr lang="ko-KR" altLang="en-US" sz="1200" dirty="0" smtClean="0"/>
-                        <a:t>사용여부 </a:t>
-                      </a:r>
-                      <a:r>
-                        <a:rPr lang="en-US" altLang="ko-KR" sz="1200" dirty="0" smtClean="0"/>
-                        <a:t>(</a:t>
-                      </a:r>
-                      <a:r>
-                        <a:rPr lang="ko-KR" altLang="en-US" sz="1200" dirty="0" smtClean="0"/>
-                        <a:t>예약됨</a:t>
-                      </a:r>
-                      <a:r>
-                        <a:rPr lang="en-US" altLang="ko-KR" sz="1200" dirty="0" smtClean="0"/>
-                        <a:t>)</a:t>
-                      </a:r>
-                      <a:endParaRPr lang="ko-KR" altLang="en-US" sz="1200" dirty="0"/>
-                    </a:p>
-                  </a:txBody>
-                  <a:tcPr anchor="ctr"/>
-                </a:tc>
-              </a:tr>
-              <a:tr h="310056">
-                <a:tc>
-                  <a:txBody>
-                    <a:bodyPr/>
-                    <a:lstStyle/>
-                    <a:p>
-                      <a:pPr algn="ctr" latinLnBrk="1"/>
-                      <a:r>
-                        <a:rPr lang="en-US" altLang="ko-KR" sz="1200" dirty="0" err="1" smtClean="0"/>
-                        <a:t>One_time</a:t>
-                      </a:r>
-                      <a:endParaRPr lang="ko-KR" altLang="en-US" sz="1200" dirty="0"/>
-                    </a:p>
-                  </a:txBody>
-                  <a:tcPr anchor="ctr"/>
-                </a:tc>
-                <a:tc>
-                  <a:txBody>
-                    <a:bodyPr/>
-                    <a:lstStyle/>
-                    <a:p>
-                      <a:pPr algn="ctr" latinLnBrk="1"/>
-                      <a:r>
-                        <a:rPr lang="en-US" altLang="ko-KR" sz="1200" dirty="0" err="1" smtClean="0"/>
-                        <a:t>Bool</a:t>
-                      </a:r>
-                      <a:endParaRPr lang="ko-KR" altLang="en-US" sz="1200" dirty="0"/>
-                    </a:p>
-                  </a:txBody>
-                  <a:tcPr anchor="ctr"/>
-                </a:tc>
-                <a:tc>
-                  <a:txBody>
-                    <a:bodyPr/>
-                    <a:lstStyle/>
-                    <a:p>
-                      <a:pPr algn="ctr" latinLnBrk="1"/>
-                      <a:r>
-                        <a:rPr lang="ko-KR" altLang="en-US" sz="1200" dirty="0" smtClean="0"/>
-                        <a:t>단발성 작업인지 여부 </a:t>
-                      </a:r>
-                      <a:r>
-                        <a:rPr lang="en-US" altLang="ko-KR" sz="1200" dirty="0" smtClean="0"/>
-                        <a:t>(</a:t>
-                      </a:r>
-                      <a:r>
-                        <a:rPr lang="ko-KR" altLang="en-US" sz="1200" dirty="0" smtClean="0"/>
-                        <a:t>단발성인 경우 </a:t>
-                      </a:r>
-                      <a:r>
-                        <a:rPr lang="ko-KR" altLang="en-US" sz="1200" dirty="0" err="1" smtClean="0"/>
-                        <a:t>사용후</a:t>
-                      </a:r>
-                      <a:r>
-                        <a:rPr lang="ko-KR" altLang="en-US" sz="1200" dirty="0" smtClean="0"/>
-                        <a:t> </a:t>
-                      </a:r>
-                      <a:r>
-                        <a:rPr lang="en-US" altLang="ko-KR" sz="1200" dirty="0" smtClean="0"/>
-                        <a:t>enabled</a:t>
-                      </a:r>
-                      <a:r>
-                        <a:rPr lang="ko-KR" altLang="en-US" sz="1200" dirty="0" smtClean="0"/>
-                        <a:t>이 </a:t>
-                      </a:r>
-                      <a:r>
-                        <a:rPr lang="en-US" altLang="ko-KR" sz="1200" dirty="0" smtClean="0"/>
-                        <a:t>false</a:t>
-                      </a:r>
-                      <a:r>
-                        <a:rPr lang="ko-KR" altLang="en-US" sz="1200" dirty="0" smtClean="0"/>
-                        <a:t>로 바뀜</a:t>
-                      </a:r>
-                      <a:r>
-                        <a:rPr lang="en-US" altLang="ko-KR" sz="1200" dirty="0" smtClean="0"/>
-                        <a:t>)</a:t>
-                      </a:r>
-                      <a:endParaRPr lang="ko-KR" altLang="en-US" sz="1200" dirty="0"/>
-                    </a:p>
-                  </a:txBody>
-                  <a:tcPr anchor="ctr"/>
-                </a:tc>
-              </a:tr>
-              <a:tr h="310056">
-                <a:tc>
-                  <a:txBody>
-                    <a:bodyPr/>
-                    <a:lstStyle/>
-                    <a:p>
-                      <a:pPr algn="ctr" latinLnBrk="1"/>
-                      <a:r>
-                        <a:rPr lang="en-US" altLang="ko-KR" sz="1200" dirty="0" smtClean="0"/>
-                        <a:t>Enabled</a:t>
-                      </a:r>
-                      <a:endParaRPr lang="ko-KR" altLang="en-US" sz="1200" dirty="0"/>
-                    </a:p>
-                  </a:txBody>
-                  <a:tcPr anchor="ctr"/>
-                </a:tc>
-                <a:tc>
-                  <a:txBody>
-                    <a:bodyPr/>
-                    <a:lstStyle/>
-                    <a:p>
-                      <a:pPr algn="ctr" latinLnBrk="1"/>
-                      <a:r>
-                        <a:rPr lang="en-US" altLang="ko-KR" sz="1200" dirty="0" err="1" smtClean="0"/>
-                        <a:t>Bool</a:t>
-                      </a:r>
-                      <a:endParaRPr lang="ko-KR" altLang="en-US" sz="1200" dirty="0"/>
-                    </a:p>
-                  </a:txBody>
-                  <a:tcPr anchor="ctr"/>
-                </a:tc>
-                <a:tc>
-                  <a:txBody>
-                    <a:bodyPr/>
-                    <a:lstStyle/>
-                    <a:p>
-                      <a:pPr algn="ctr" latinLnBrk="1"/>
-                      <a:r>
-                        <a:rPr lang="ko-KR" altLang="en-US" sz="1200" dirty="0" smtClean="0"/>
-                        <a:t>사용여부 </a:t>
-                      </a:r>
-                      <a:r>
-                        <a:rPr lang="en-US" altLang="ko-KR" sz="1200" dirty="0" smtClean="0"/>
-                        <a:t>(</a:t>
-                      </a:r>
-                      <a:r>
-                        <a:rPr lang="ko-KR" altLang="en-US" sz="1200" dirty="0" smtClean="0"/>
-                        <a:t>예약됨</a:t>
-                      </a:r>
-                      <a:r>
-                        <a:rPr lang="en-US" altLang="ko-KR" sz="1200" dirty="0" smtClean="0"/>
-                        <a:t>)</a:t>
-                      </a:r>
-                      <a:endParaRPr lang="ko-KR" altLang="en-US" sz="1200" dirty="0"/>
-                    </a:p>
-                  </a:txBody>
-                  <a:tcPr anchor="ctr"/>
-                </a:tc>
-              </a:tr>
-              <a:tr h="310056">
-                <a:tc>
-                  <a:txBody>
-                    <a:bodyPr/>
-                    <a:lstStyle/>
-                    <a:p>
-                      <a:pPr algn="ctr" latinLnBrk="1"/>
-                      <a:r>
-                        <a:rPr lang="en-US" altLang="ko-KR" sz="1200" dirty="0" err="1" smtClean="0"/>
-                        <a:t>Active_date</a:t>
-                      </a:r>
-                      <a:endParaRPr lang="ko-KR" altLang="en-US" sz="1200" dirty="0"/>
-                    </a:p>
-                  </a:txBody>
-                  <a:tcPr anchor="ctr"/>
-                </a:tc>
-                <a:tc>
-                  <a:txBody>
-                    <a:bodyPr/>
-                    <a:lstStyle/>
-                    <a:p>
-                      <a:pPr algn="ctr" latinLnBrk="1"/>
-                      <a:r>
-                        <a:rPr lang="en-US" altLang="ko-KR" sz="1200" dirty="0" smtClean="0"/>
-                        <a:t>Timestamp</a:t>
-                      </a:r>
-                      <a:endParaRPr lang="ko-KR" altLang="en-US" sz="1200" dirty="0"/>
-                    </a:p>
-                  </a:txBody>
-                  <a:tcPr anchor="ctr"/>
-                </a:tc>
-                <a:tc>
-                  <a:txBody>
-                    <a:bodyPr/>
-                    <a:lstStyle/>
-                    <a:p>
-                      <a:pPr algn="ctr" latinLnBrk="1"/>
-                      <a:r>
-                        <a:rPr lang="ko-KR" altLang="en-US" sz="1200" dirty="0" smtClean="0"/>
-                        <a:t>단발성 작업의 동작시간을 설정함</a:t>
-                      </a:r>
-                      <a:endParaRPr lang="ko-KR" altLang="en-US" sz="1200" dirty="0"/>
-                    </a:p>
-                  </a:txBody>
-                  <a:tcPr anchor="ctr"/>
-                </a:tc>
-              </a:tr>
-              <a:tr h="310056">
-                <a:tc>
-                  <a:txBody>
-                    <a:bodyPr/>
-                    <a:lstStyle/>
-                    <a:p>
-                      <a:pPr algn="ctr" latinLnBrk="1"/>
-                      <a:r>
-                        <a:rPr lang="en-US" altLang="ko-KR" sz="1200" dirty="0" err="1" smtClean="0"/>
-                        <a:t>Daysofweek</a:t>
-                      </a:r>
-                      <a:endParaRPr lang="ko-KR" altLang="en-US" sz="1200" dirty="0"/>
-                    </a:p>
-                  </a:txBody>
-                  <a:tcPr anchor="ctr"/>
-                </a:tc>
-                <a:tc>
-                  <a:txBody>
-                    <a:bodyPr/>
-                    <a:lstStyle/>
-                    <a:p>
-                      <a:pPr algn="ctr" latinLnBrk="1"/>
-                      <a:r>
-                        <a:rPr lang="en-US" altLang="ko-KR" sz="1200" dirty="0" smtClean="0"/>
-                        <a:t>Array</a:t>
-                      </a:r>
-                      <a:endParaRPr lang="ko-KR" altLang="en-US" sz="1200" dirty="0"/>
-                    </a:p>
-                  </a:txBody>
-                  <a:tcPr anchor="ctr"/>
-                </a:tc>
-                <a:tc>
-                  <a:txBody>
-                    <a:bodyPr/>
-                    <a:lstStyle/>
-                    <a:p>
-                      <a:pPr algn="ctr" latinLnBrk="1"/>
-                      <a:r>
-                        <a:rPr lang="ko-KR" altLang="en-US" sz="1200" dirty="0" smtClean="0"/>
-                        <a:t>반복작업의 요일지정 </a:t>
-                      </a:r>
-                      <a:r>
-                        <a:rPr lang="en-US" altLang="ko-KR" sz="1200" dirty="0" smtClean="0"/>
-                        <a:t>(</a:t>
-                      </a:r>
-                      <a:r>
-                        <a:rPr lang="en-US" altLang="ko-KR" sz="1200" dirty="0" err="1" smtClean="0"/>
-                        <a:t>bool</a:t>
-                      </a:r>
-                      <a:r>
-                        <a:rPr lang="en-US" altLang="ko-KR" sz="1200" dirty="0" smtClean="0"/>
-                        <a:t>:</a:t>
-                      </a:r>
-                      <a:r>
-                        <a:rPr lang="ko-KR" altLang="en-US" sz="1200" dirty="0" err="1" smtClean="0"/>
-                        <a:t>월화수목금토일</a:t>
-                      </a:r>
-                      <a:r>
-                        <a:rPr lang="en-US" altLang="ko-KR" sz="1200" dirty="0" smtClean="0"/>
-                        <a:t>)</a:t>
-                      </a:r>
-                      <a:endParaRPr lang="ko-KR" altLang="en-US" sz="1200" dirty="0"/>
-                    </a:p>
-                  </a:txBody>
-                  <a:tcPr anchor="ctr"/>
-                </a:tc>
-              </a:tr>
-              <a:tr h="310056">
-                <a:tc>
-                  <a:txBody>
-                    <a:bodyPr/>
-                    <a:lstStyle/>
-                    <a:p>
-                      <a:pPr algn="ctr" latinLnBrk="1"/>
-                      <a:r>
-                        <a:rPr lang="en-US" altLang="ko-KR" sz="1200" dirty="0" err="1" smtClean="0"/>
-                        <a:t>Start_time</a:t>
-                      </a:r>
-                      <a:endParaRPr lang="ko-KR" altLang="en-US" sz="1200" dirty="0"/>
-                    </a:p>
-                  </a:txBody>
-                  <a:tcPr anchor="ctr"/>
-                </a:tc>
-                <a:tc>
-                  <a:txBody>
-                    <a:bodyPr/>
-                    <a:lstStyle/>
-                    <a:p>
-                      <a:pPr algn="ctr" latinLnBrk="1"/>
-                      <a:r>
-                        <a:rPr lang="en-US" altLang="ko-KR" sz="1200" dirty="0" smtClean="0"/>
-                        <a:t>String</a:t>
-                      </a:r>
-                      <a:endParaRPr lang="ko-KR" altLang="en-US" sz="1200" dirty="0"/>
-                    </a:p>
-                  </a:txBody>
-                  <a:tcPr anchor="ctr"/>
-                </a:tc>
-                <a:tc>
-                  <a:txBody>
-                    <a:bodyPr/>
-                    <a:lstStyle/>
-                    <a:p>
-                      <a:pPr algn="ctr" latinLnBrk="1"/>
-                      <a:r>
-                        <a:rPr lang="ko-KR" altLang="en-US" sz="1200" dirty="0" smtClean="0"/>
-                        <a:t>반복작업의 시작 시간 지정 </a:t>
-                      </a:r>
-                      <a:r>
-                        <a:rPr lang="en-US" altLang="ko-KR" sz="1200" dirty="0" smtClean="0"/>
-                        <a:t>ex)12</a:t>
-                      </a:r>
-                      <a:r>
-                        <a:rPr lang="ko-KR" altLang="en-US" sz="1200" dirty="0" smtClean="0"/>
-                        <a:t>시</a:t>
-                      </a:r>
-                      <a:r>
-                        <a:rPr lang="en-US" altLang="ko-KR" sz="1200" dirty="0" smtClean="0"/>
-                        <a:t>05</a:t>
-                      </a:r>
-                      <a:r>
-                        <a:rPr lang="ko-KR" altLang="en-US" sz="1200" dirty="0" err="1" smtClean="0"/>
-                        <a:t>분시작</a:t>
-                      </a:r>
-                      <a:r>
-                        <a:rPr lang="ko-KR" altLang="en-US" sz="1200" dirty="0" smtClean="0"/>
-                        <a:t> </a:t>
-                      </a:r>
-                      <a:r>
-                        <a:rPr lang="en-US" altLang="ko-KR" sz="1200" dirty="0" smtClean="0"/>
-                        <a:t>-&gt; 1205</a:t>
-                      </a:r>
-                      <a:endParaRPr lang="ko-KR" altLang="en-US" sz="1200" dirty="0"/>
-                    </a:p>
-                  </a:txBody>
-                  <a:tcPr anchor="ctr"/>
-                </a:tc>
-              </a:tr>
-              <a:tr h="310056">
-                <a:tc>
-                  <a:txBody>
-                    <a:bodyPr/>
-                    <a:lstStyle/>
-                    <a:p>
-                      <a:pPr algn="ctr" latinLnBrk="1"/>
-                      <a:r>
-                        <a:rPr lang="en-US" altLang="ko-KR" sz="1200" dirty="0" err="1" smtClean="0"/>
-                        <a:t>End_time</a:t>
-                      </a:r>
-                      <a:endParaRPr lang="ko-KR" altLang="en-US" sz="1200" dirty="0"/>
-                    </a:p>
-                  </a:txBody>
-                  <a:tcPr anchor="ctr"/>
-                </a:tc>
-                <a:tc>
-                  <a:txBody>
-                    <a:bodyPr/>
-                    <a:lstStyle/>
-                    <a:p>
-                      <a:pPr algn="ctr" latinLnBrk="1"/>
-                      <a:r>
-                        <a:rPr lang="en-US" altLang="ko-KR" sz="1200" dirty="0" smtClean="0"/>
-                        <a:t>String</a:t>
-                      </a:r>
-                      <a:endParaRPr lang="ko-KR" altLang="en-US" sz="1200" dirty="0"/>
-                    </a:p>
-                  </a:txBody>
-                  <a:tcPr anchor="ctr"/>
-                </a:tc>
-                <a:tc>
-                  <a:txBody>
-                    <a:bodyPr/>
-                    <a:lstStyle/>
-                    <a:p>
-                      <a:pPr algn="ctr" latinLnBrk="1"/>
-                      <a:r>
-                        <a:rPr lang="ko-KR" altLang="en-US" sz="1200" dirty="0" smtClean="0"/>
-                        <a:t>반복작업의 종료 시간 시정 </a:t>
-                      </a:r>
-                      <a:r>
-                        <a:rPr lang="en-US" altLang="ko-KR" sz="1200" dirty="0" smtClean="0"/>
-                        <a:t>ex)13</a:t>
-                      </a:r>
-                      <a:r>
-                        <a:rPr lang="ko-KR" altLang="en-US" sz="1200" dirty="0" smtClean="0"/>
-                        <a:t>시</a:t>
-                      </a:r>
-                      <a:r>
-                        <a:rPr lang="en-US" altLang="ko-KR" sz="1200" dirty="0" smtClean="0"/>
-                        <a:t>10</a:t>
-                      </a:r>
-                      <a:r>
-                        <a:rPr lang="ko-KR" altLang="en-US" sz="1200" dirty="0" err="1" smtClean="0"/>
-                        <a:t>분종료</a:t>
-                      </a:r>
-                      <a:r>
-                        <a:rPr lang="ko-KR" altLang="en-US" sz="1200" dirty="0" smtClean="0"/>
-                        <a:t> </a:t>
-                      </a:r>
-                      <a:r>
-                        <a:rPr lang="en-US" altLang="ko-KR" sz="1200" dirty="0" smtClean="0"/>
-                        <a:t>-&gt; 1310</a:t>
-                      </a:r>
-                      <a:endParaRPr lang="ko-KR" altLang="en-US" sz="1200" dirty="0"/>
-                    </a:p>
-                  </a:txBody>
-                  <a:tcPr anchor="ctr"/>
-                </a:tc>
-              </a:tr>
-              <a:tr h="310056">
-                <a:tc>
-                  <a:txBody>
-                    <a:bodyPr/>
-                    <a:lstStyle/>
-                    <a:p>
-                      <a:pPr algn="ctr" latinLnBrk="1"/>
-                      <a:r>
-                        <a:rPr lang="en-US" altLang="ko-KR" sz="1200" dirty="0" err="1" smtClean="0"/>
-                        <a:t>Devcie_aircon</a:t>
-                      </a:r>
-                      <a:endParaRPr lang="ko-KR" altLang="en-US" sz="1200" dirty="0"/>
-                    </a:p>
-                  </a:txBody>
-                  <a:tcPr anchor="ctr"/>
-                </a:tc>
-                <a:tc>
-                  <a:txBody>
-                    <a:bodyPr/>
-                    <a:lstStyle/>
-                    <a:p>
-                      <a:pPr algn="ctr" latinLnBrk="1"/>
-                      <a:r>
-                        <a:rPr lang="en-US" altLang="ko-KR" sz="1200" dirty="0" smtClean="0"/>
-                        <a:t>Array</a:t>
-                      </a:r>
-                      <a:endParaRPr lang="ko-KR" altLang="en-US" sz="1200" dirty="0"/>
-                    </a:p>
-                  </a:txBody>
-                  <a:tcPr anchor="ctr"/>
-                </a:tc>
-                <a:tc>
-                  <a:txBody>
-                    <a:bodyPr/>
-                    <a:lstStyle/>
-                    <a:p>
-                      <a:pPr algn="ctr" latinLnBrk="1"/>
-                      <a:r>
-                        <a:rPr lang="ko-KR" altLang="en-US" sz="1200" dirty="0" smtClean="0"/>
-                        <a:t>동작여부</a:t>
-                      </a:r>
-                      <a:r>
-                        <a:rPr lang="en-US" altLang="ko-KR" sz="1200" dirty="0" smtClean="0"/>
-                        <a:t>(</a:t>
-                      </a:r>
-                      <a:r>
-                        <a:rPr lang="en-US" altLang="ko-KR" sz="1200" dirty="0" err="1" smtClean="0"/>
-                        <a:t>bool</a:t>
-                      </a:r>
-                      <a:r>
-                        <a:rPr lang="en-US" altLang="ko-KR" sz="1200" dirty="0" smtClean="0"/>
-                        <a:t>),</a:t>
-                      </a:r>
-                      <a:r>
-                        <a:rPr lang="en-US" altLang="ko-KR" sz="1200" baseline="0" dirty="0" smtClean="0"/>
-                        <a:t> </a:t>
-                      </a:r>
-                      <a:r>
-                        <a:rPr lang="ko-KR" altLang="en-US" sz="1200" baseline="0" dirty="0" smtClean="0"/>
-                        <a:t>설정온도</a:t>
-                      </a:r>
-                      <a:r>
-                        <a:rPr lang="en-US" altLang="ko-KR" sz="1200" baseline="0" dirty="0" smtClean="0"/>
-                        <a:t>(number), </a:t>
-                      </a:r>
-                      <a:r>
-                        <a:rPr lang="ko-KR" altLang="en-US" sz="1200" baseline="0" dirty="0" err="1" smtClean="0"/>
-                        <a:t>풍량</a:t>
-                      </a:r>
-                      <a:r>
-                        <a:rPr lang="en-US" altLang="ko-KR" sz="1200" baseline="0" dirty="0" smtClean="0"/>
-                        <a:t>(number)</a:t>
-                      </a:r>
-                      <a:endParaRPr lang="ko-KR" altLang="en-US" sz="1200" dirty="0"/>
-                    </a:p>
-                  </a:txBody>
-                  <a:tcPr anchor="ctr"/>
-                </a:tc>
-              </a:tr>
-              <a:tr h="310056">
-                <a:tc>
-                  <a:txBody>
-                    <a:bodyPr/>
-                    <a:lstStyle/>
-                    <a:p>
-                      <a:pPr algn="ctr" latinLnBrk="1"/>
-                      <a:r>
-                        <a:rPr lang="en-US" altLang="ko-KR" sz="1200" dirty="0" err="1" smtClean="0"/>
-                        <a:t>Device_light</a:t>
-                      </a:r>
-                      <a:endParaRPr lang="ko-KR" altLang="en-US" sz="1200" dirty="0"/>
-                    </a:p>
-                  </a:txBody>
-                  <a:tcPr anchor="ctr"/>
-                </a:tc>
-                <a:tc>
-                  <a:txBody>
-                    <a:bodyPr/>
-                    <a:lstStyle/>
-                    <a:p>
-                      <a:pPr algn="ctr" latinLnBrk="1"/>
-                      <a:r>
-                        <a:rPr lang="en-US" altLang="ko-KR" sz="1200" dirty="0" smtClean="0"/>
-                        <a:t>Array</a:t>
-                      </a:r>
-                      <a:endParaRPr lang="ko-KR" altLang="en-US" sz="1200" dirty="0"/>
-                    </a:p>
-                  </a:txBody>
-                  <a:tcPr anchor="ctr"/>
-                </a:tc>
-                <a:tc>
-                  <a:txBody>
-                    <a:bodyPr/>
-                    <a:lstStyle/>
-                    <a:p>
-                      <a:pPr algn="ctr" latinLnBrk="1"/>
-                      <a:r>
-                        <a:rPr lang="ko-KR" altLang="en-US" sz="1200" dirty="0" smtClean="0"/>
-                        <a:t>동작여부</a:t>
-                      </a:r>
-                      <a:r>
-                        <a:rPr lang="en-US" altLang="ko-KR" sz="1200" dirty="0" smtClean="0"/>
-                        <a:t>(</a:t>
-                      </a:r>
-                      <a:r>
-                        <a:rPr lang="en-US" altLang="ko-KR" sz="1200" dirty="0" err="1" smtClean="0"/>
-                        <a:t>bool</a:t>
-                      </a:r>
-                      <a:r>
-                        <a:rPr lang="en-US" altLang="ko-KR" sz="1200" dirty="0" smtClean="0"/>
-                        <a:t>), </a:t>
-                      </a:r>
-                      <a:r>
-                        <a:rPr lang="ko-KR" altLang="en-US" sz="1200" dirty="0" smtClean="0"/>
-                        <a:t>밝기</a:t>
-                      </a:r>
-                      <a:r>
-                        <a:rPr lang="en-US" altLang="ko-KR" sz="1200" dirty="0" smtClean="0"/>
-                        <a:t>(number), </a:t>
-                      </a:r>
-                      <a:r>
-                        <a:rPr lang="ko-KR" altLang="en-US" sz="1200" dirty="0" smtClean="0"/>
-                        <a:t>색상</a:t>
-                      </a:r>
-                      <a:r>
-                        <a:rPr lang="en-US" altLang="ko-KR" sz="1200" dirty="0" smtClean="0"/>
-                        <a:t>(string)</a:t>
-                      </a:r>
-                      <a:endParaRPr lang="ko-KR" altLang="en-US" sz="1200" dirty="0"/>
-                    </a:p>
-                  </a:txBody>
-                  <a:tcPr anchor="ctr"/>
-                </a:tc>
-              </a:tr>
-              <a:tr h="310056">
-                <a:tc>
-                  <a:txBody>
-                    <a:bodyPr/>
-                    <a:lstStyle/>
-                    <a:p>
-                      <a:pPr algn="ctr" latinLnBrk="1"/>
-                      <a:r>
-                        <a:rPr lang="en-US" altLang="ko-KR" sz="1200" dirty="0" err="1" smtClean="0"/>
-                        <a:t>Device_gas</a:t>
-                      </a:r>
-                      <a:endParaRPr lang="ko-KR" altLang="en-US" sz="1200" dirty="0"/>
-                    </a:p>
-                  </a:txBody>
-                  <a:tcPr anchor="ctr"/>
-                </a:tc>
-                <a:tc>
-                  <a:txBody>
-                    <a:bodyPr/>
-                    <a:lstStyle/>
-                    <a:p>
-                      <a:pPr algn="ctr" latinLnBrk="1"/>
-                      <a:r>
-                        <a:rPr lang="en-US" altLang="ko-KR" sz="1200" dirty="0" smtClean="0"/>
-                        <a:t>Array</a:t>
-                      </a:r>
-                      <a:endParaRPr lang="ko-KR" altLang="en-US" sz="1200" dirty="0"/>
-                    </a:p>
-                  </a:txBody>
-                  <a:tcPr anchor="ctr"/>
-                </a:tc>
-                <a:tc>
-                  <a:txBody>
-                    <a:bodyPr/>
-                    <a:lstStyle/>
-                    <a:p>
-                      <a:pPr algn="ctr" latinLnBrk="1"/>
-                      <a:r>
-                        <a:rPr lang="ko-KR" altLang="en-US" sz="1200" dirty="0" smtClean="0"/>
-                        <a:t>사용여부</a:t>
-                      </a:r>
-                      <a:r>
-                        <a:rPr lang="en-US" altLang="ko-KR" sz="1200" dirty="0" smtClean="0"/>
-                        <a:t>(</a:t>
-                      </a:r>
-                      <a:r>
-                        <a:rPr lang="en-US" altLang="ko-KR" sz="1200" dirty="0" err="1" smtClean="0"/>
-                        <a:t>bool</a:t>
-                      </a:r>
-                      <a:r>
-                        <a:rPr lang="en-US" altLang="ko-KR" sz="1200" dirty="0" smtClean="0"/>
-                        <a:t>)</a:t>
-                      </a:r>
-                      <a:endParaRPr lang="ko-KR" altLang="en-US" sz="1200" dirty="0"/>
-                    </a:p>
-                  </a:txBody>
-                  <a:tcPr anchor="ctr"/>
-                </a:tc>
-              </a:tr>
-              <a:tr h="310056">
-                <a:tc>
-                  <a:txBody>
-                    <a:bodyPr/>
-                    <a:lstStyle/>
-                    <a:p>
-                      <a:pPr algn="ctr" latinLnBrk="1"/>
-                      <a:r>
-                        <a:rPr lang="en-US" altLang="ko-KR" sz="1200" dirty="0" err="1" smtClean="0"/>
-                        <a:t>Device_window</a:t>
-                      </a:r>
-                      <a:endParaRPr lang="ko-KR" altLang="en-US" sz="1200" dirty="0"/>
-                    </a:p>
-                  </a:txBody>
-                  <a:tcPr anchor="ctr"/>
-                </a:tc>
-                <a:tc>
-                  <a:txBody>
-                    <a:bodyPr/>
-                    <a:lstStyle/>
-                    <a:p>
-                      <a:pPr algn="ctr" latinLnBrk="1"/>
-                      <a:r>
-                        <a:rPr lang="en-US" altLang="ko-KR" sz="1200" dirty="0" smtClean="0"/>
-                        <a:t>Array</a:t>
-                      </a:r>
-                      <a:endParaRPr lang="ko-KR" altLang="en-US" sz="1200" dirty="0"/>
-                    </a:p>
-                  </a:txBody>
-                  <a:tcPr anchor="ctr"/>
-                </a:tc>
-                <a:tc>
-                  <a:txBody>
-                    <a:bodyPr/>
-                    <a:lstStyle/>
-                    <a:p>
-                      <a:pPr algn="ctr" latinLnBrk="1"/>
-                      <a:r>
-                        <a:rPr lang="ko-KR" altLang="en-US" sz="1200" dirty="0" err="1" smtClean="0"/>
-                        <a:t>열림닫힘여부</a:t>
-                      </a:r>
-                      <a:r>
-                        <a:rPr lang="en-US" altLang="ko-KR" sz="1200" dirty="0" smtClean="0"/>
-                        <a:t>(</a:t>
-                      </a:r>
-                      <a:r>
-                        <a:rPr lang="en-US" altLang="ko-KR" sz="1200" dirty="0" err="1" smtClean="0"/>
-                        <a:t>bool</a:t>
-                      </a:r>
-                      <a:r>
-                        <a:rPr lang="en-US" altLang="ko-KR" sz="1200" dirty="0" smtClean="0"/>
-                        <a:t>)</a:t>
-                      </a:r>
-                      <a:endParaRPr lang="ko-KR" altLang="en-US" sz="1200" dirty="0"/>
-                    </a:p>
-                  </a:txBody>
-                  <a:tcPr anchor="ctr"/>
-                </a:tc>
-              </a:tr>
-            </a:tbl>
-          </a:graphicData>
-        </a:graphic>
-      </p:graphicFrame>
-      <p:sp>
-        <p:nvSpPr>
-          <p:cNvPr id="4" name="TextBox 3"/>
-          <p:cNvSpPr txBox="1"/>
-          <p:nvPr/>
-        </p:nvSpPr>
-        <p:spPr>
-          <a:xfrm>
-            <a:off x="944088" y="1442852"/>
-            <a:ext cx="3876382" cy="646331"/>
-          </a:xfrm>
-          <a:prstGeom prst="rect">
-            <a:avLst/>
-          </a:prstGeom>
-          <a:noFill/>
-        </p:spPr>
-        <p:txBody>
-          <a:bodyPr wrap="none" rtlCol="0">
-            <a:spAutoFit/>
-          </a:bodyPr>
-          <a:lstStyle/>
-          <a:p>
-            <a:r>
-              <a:rPr lang="en-US" altLang="ko-KR" dirty="0" err="1" smtClean="0"/>
-              <a:t>schedule_mode</a:t>
-            </a:r>
-            <a:endParaRPr lang="en-US" altLang="ko-KR" dirty="0" smtClean="0"/>
-          </a:p>
-          <a:p>
-            <a:r>
-              <a:rPr lang="ko-KR" altLang="en-US" dirty="0" smtClean="0"/>
-              <a:t>가전동작에 대한</a:t>
-            </a:r>
-            <a:r>
-              <a:rPr lang="en-US" altLang="ko-KR" dirty="0"/>
-              <a:t> </a:t>
-            </a:r>
-            <a:r>
-              <a:rPr lang="ko-KR" altLang="en-US" dirty="0" smtClean="0"/>
-              <a:t>모드들을 기억함</a:t>
-            </a:r>
-            <a:r>
-              <a:rPr lang="en-US" altLang="ko-KR" dirty="0" smtClean="0"/>
-              <a:t>.</a:t>
-            </a:r>
-            <a:r>
-              <a:rPr lang="ko-KR" altLang="en-US" dirty="0" smtClean="0"/>
-              <a:t> </a:t>
-            </a:r>
-            <a:endParaRPr lang="ko-KR" altLang="en-US" dirty="0"/>
-          </a:p>
-        </p:txBody>
-      </p:sp>
-      <p:sp>
-        <p:nvSpPr>
-          <p:cNvPr id="7" name="TextBox 6"/>
-          <p:cNvSpPr txBox="1"/>
-          <p:nvPr/>
-        </p:nvSpPr>
-        <p:spPr>
-          <a:xfrm>
-            <a:off x="-14892" y="2692400"/>
-            <a:ext cx="1271502" cy="430887"/>
-          </a:xfrm>
-          <a:prstGeom prst="rect">
-            <a:avLst/>
-          </a:prstGeom>
-          <a:noFill/>
-        </p:spPr>
-        <p:txBody>
-          <a:bodyPr wrap="none" rtlCol="0">
-            <a:spAutoFit/>
-          </a:bodyPr>
-          <a:lstStyle/>
-          <a:p>
-            <a:r>
-              <a:rPr lang="en-US" altLang="ko-KR" sz="1100" b="1" dirty="0" smtClean="0">
-                <a:solidFill>
-                  <a:srgbClr val="00B0F0"/>
-                </a:solidFill>
-              </a:rPr>
-              <a:t>Document ID </a:t>
-            </a:r>
-            <a:r>
-              <a:rPr lang="ko-KR" altLang="en-US" sz="1100" b="1" dirty="0" smtClean="0">
-                <a:solidFill>
-                  <a:srgbClr val="00B0F0"/>
-                </a:solidFill>
-              </a:rPr>
-              <a:t>→</a:t>
-            </a:r>
-            <a:endParaRPr lang="en-US" altLang="ko-KR" sz="1100" b="1" dirty="0" smtClean="0">
-              <a:solidFill>
-                <a:srgbClr val="00B0F0"/>
-              </a:solidFill>
-            </a:endParaRPr>
-          </a:p>
-          <a:p>
-            <a:r>
-              <a:rPr lang="en-US" altLang="ko-KR" sz="1100" b="1" dirty="0" smtClean="0">
-                <a:solidFill>
-                  <a:srgbClr val="00B0F0"/>
-                </a:solidFill>
-              </a:rPr>
-              <a:t>(</a:t>
-            </a:r>
-            <a:r>
-              <a:rPr lang="en-US" altLang="ko-KR" sz="1100" b="1" dirty="0" err="1" smtClean="0">
-                <a:solidFill>
-                  <a:srgbClr val="00B0F0"/>
-                </a:solidFill>
-              </a:rPr>
-              <a:t>PrimaryKey</a:t>
-            </a:r>
-            <a:r>
-              <a:rPr lang="en-US" altLang="ko-KR" sz="1100" b="1" dirty="0" smtClean="0">
-                <a:solidFill>
-                  <a:srgbClr val="00B0F0"/>
-                </a:solidFill>
-              </a:rPr>
-              <a:t>)</a:t>
-            </a:r>
-            <a:endParaRPr lang="ko-KR" altLang="en-US" sz="1100" b="1" dirty="0">
-              <a:solidFill>
-                <a:srgbClr val="00B0F0"/>
-              </a:solidFill>
-            </a:endParaRPr>
-          </a:p>
-        </p:txBody>
-      </p:sp>
-    </p:spTree>
-    <p:extLst>
-      <p:ext uri="{BB962C8B-B14F-4D97-AF65-F5344CB8AC3E}">
-        <p14:creationId xmlns:p14="http://schemas.microsoft.com/office/powerpoint/2010/main" val="238791827"/>
-      </p:ext>
-    </p:extLst>
-  </p:cSld>
-  <p:clrMapOvr>
-    <a:masterClrMapping/>
-  </p:clrMapOvr>
-  <p:timing>
-    <p:tnLst>
-      <p:par>
-        <p:cTn id="1" dur="indefinite" restart="never" nodeType="tmRoot"/>
-      </p:par>
-    </p:tnLst>
-  </p:timing>
-</p:sld>
-</file>
-
-<file path=ppt/slides/slide8.xml><?xml version="1.0" encoding="utf-8"?>
-<p:sld xmlns:a="http://schemas.openxmlformats.org/drawingml/2006/main" xmlns:r="http://schemas.openxmlformats.org/officeDocument/2006/relationships" xmlns:p="http://schemas.openxmlformats.org/presentationml/2006/main">
-  <p:cSld>
-    <p:spTree>
-      <p:nvGrpSpPr>
-        <p:cNvPr id="1" name=""/>
-        <p:cNvGrpSpPr/>
-        <p:nvPr/>
-      </p:nvGrpSpPr>
-      <p:grpSpPr>
-        <a:xfrm>
-          <a:off x="0" y="0"/>
-          <a:ext cx="0" cy="0"/>
-          <a:chOff x="0" y="0"/>
-          <a:chExt cx="0" cy="0"/>
-        </a:xfrm>
-      </p:grpSpPr>
-      <p:sp>
-        <p:nvSpPr>
-          <p:cNvPr id="2" name="제목 1"/>
-          <p:cNvSpPr>
-            <a:spLocks noGrp="1"/>
-          </p:cNvSpPr>
-          <p:nvPr>
-            <p:ph type="title"/>
-          </p:nvPr>
-        </p:nvSpPr>
-        <p:spPr/>
-        <p:txBody>
-          <a:bodyPr/>
-          <a:lstStyle/>
-          <a:p>
-            <a:r>
-              <a:rPr lang="ko-KR" altLang="en-US" dirty="0" err="1" smtClean="0"/>
-              <a:t>파이어베이스</a:t>
-            </a:r>
-            <a:r>
-              <a:rPr lang="ko-KR" altLang="en-US" dirty="0" smtClean="0"/>
-              <a:t> 구축 </a:t>
-            </a:r>
-            <a:r>
-              <a:rPr lang="en-US" altLang="ko-KR" dirty="0" smtClean="0"/>
-              <a:t>(Storage)</a:t>
+              <a:t>Storage</a:t>
             </a:r>
             <a:endParaRPr lang="ko-KR" altLang="en-US" dirty="0"/>
           </a:p>
@@ -7505,7 +7585,7 @@
         <p:spPr>
           <a:xfrm>
             <a:off x="944088" y="1442852"/>
-            <a:ext cx="4079643" cy="646331"/>
+            <a:ext cx="4079643" cy="369332"/>
           </a:xfrm>
           <a:prstGeom prst="rect">
             <a:avLst/>
@@ -7519,14 +7599,12 @@
           <a:lstStyle/>
           <a:p>
             <a:r>
-              <a:rPr lang="en-US" altLang="ko-KR" dirty="0" smtClean="0"/>
-              <a:t>Storage</a:t>
-            </a:r>
-          </a:p>
-          <a:p>
-            <a:r>
               <a:rPr lang="ko-KR" altLang="en-US" dirty="0" smtClean="0"/>
-              <a:t>사진 등의 데이터를 보관하는 </a:t>
+              <a:t>사진 </a:t>
+            </a:r>
+            <a:r>
+              <a:rPr lang="ko-KR" altLang="en-US" dirty="0" smtClean="0"/>
+              <a:t>등의 데이터를 보관하는 </a:t>
             </a:r>
             <a:r>
               <a:rPr lang="en-US" altLang="ko-KR" dirty="0" smtClean="0"/>
@@ -7645,7 +7723,7 @@
 </p:sld>
 </file>
 
-<file path=ppt/slides/slide9.xml><?xml version="1.0" encoding="utf-8"?>
+<file path=ppt/slides/slide8.xml><?xml version="1.0" encoding="utf-8"?>
 <p:sld xmlns:a="http://schemas.openxmlformats.org/drawingml/2006/main" xmlns:r="http://schemas.openxmlformats.org/officeDocument/2006/relationships" xmlns:p="http://schemas.openxmlformats.org/presentationml/2006/main">
   <p:cSld>
     <p:spTree>
@@ -7796,24 +7874,12 @@
           <a:lstStyle/>
           <a:p>
             <a:r>
-              <a:rPr lang="ko-KR" altLang="en-US" dirty="0" err="1" smtClean="0"/>
-              <a:t>파이어베이스</a:t>
-            </a:r>
-            <a:r>
-              <a:rPr lang="ko-KR" altLang="en-US" dirty="0" smtClean="0"/>
-              <a:t> 구축 </a:t>
-            </a:r>
-            <a:r>
-              <a:rPr lang="en-US" altLang="ko-KR" dirty="0" smtClean="0"/>
-              <a:t>(</a:t>
-            </a:r>
-            <a:r>
               <a:rPr lang="en-US" altLang="ko-KR" dirty="0" err="1" smtClean="0"/>
               <a:t>RealTime</a:t>
             </a:r>
             <a:r>
               <a:rPr lang="en-US" altLang="ko-KR" dirty="0" smtClean="0"/>
-              <a:t> DB)</a:t>
+              <a:t> DB</a:t>
             </a:r>
             <a:endParaRPr lang="ko-KR" altLang="en-US" dirty="0"/>
           </a:p>
@@ -7828,7 +7894,7 @@
         <p:spPr>
           <a:xfrm>
             <a:off x="944088" y="1442852"/>
-            <a:ext cx="4487126" cy="646331"/>
+            <a:ext cx="8531503" cy="369332"/>
           </a:xfrm>
           <a:prstGeom prst="rect">
             <a:avLst/>
@@ -7842,23 +7908,54 @@
           <a:lstStyle/>
           <a:p>
             <a:r>
-              <a:rPr lang="en-US" altLang="ko-KR" dirty="0" err="1" smtClean="0"/>
-              <a:t>RealTime</a:t>
+              <a:rPr lang="ko-KR" altLang="en-US" dirty="0" smtClean="0"/>
+              <a:t>실시간으로 </a:t>
+            </a:r>
+            <a:r>
+              <a:rPr lang="ko-KR" altLang="en-US" dirty="0" smtClean="0"/>
+              <a:t>변화하는 데이터 값들을 저장</a:t>
             </a:r>
             <a:r>
               <a:rPr lang="en-US" altLang="ko-KR" dirty="0" smtClean="0"/>
-              <a:t> DB</a:t>
-            </a:r>
-          </a:p>
-          <a:p>
+              <a:t>. (</a:t>
+            </a:r>
+            <a:r>
+              <a:rPr lang="ko-KR" altLang="en-US" dirty="0" err="1" smtClean="0"/>
+              <a:t>센싱값</a:t>
+            </a:r>
+            <a:r>
+              <a:rPr lang="en-US" altLang="ko-KR" dirty="0" smtClean="0"/>
+              <a:t>, </a:t>
+            </a:r>
+            <a:r>
+              <a:rPr lang="ko-KR" altLang="en-US" dirty="0" err="1" smtClean="0"/>
+              <a:t>스마트홈</a:t>
+            </a:r>
             <a:r>
               <a:rPr lang="ko-KR" altLang="en-US" dirty="0" smtClean="0"/>
-              <a:t>실시간으로 변화하는 데이터 값들을 저장</a:t>
+              <a:t> </a:t>
+            </a:r>
+            <a:r>
+              <a:rPr lang="ko-KR" altLang="en-US" dirty="0" err="1" smtClean="0"/>
+              <a:t>현상태</a:t>
             </a:r>
             <a:r>
               <a:rPr lang="en-US" altLang="ko-KR" dirty="0" smtClean="0"/>
-              <a:t>.</a:t>
-            </a:r>
+              <a:t>, </a:t>
+            </a:r>
+            <a:r>
+              <a:rPr lang="ko-KR" altLang="en-US" dirty="0" smtClean="0"/>
+              <a:t>차량 </a:t>
+            </a:r>
+            <a:r>
+              <a:rPr lang="ko-KR" altLang="en-US" dirty="0" err="1" smtClean="0"/>
+              <a:t>현상태</a:t>
+            </a:r>
+            <a:r>
+              <a:rPr lang="en-US" altLang="ko-KR" dirty="0" smtClean="0"/>
+              <a:t>)</a:t>
+            </a:r>
+            <a:endParaRPr lang="en-US" altLang="ko-KR" dirty="0" smtClean="0"/>
           </a:p>
         </p:txBody>
       </p:sp>

</xml_diff>